<commit_message>
Update presentation files and rename Architect's Guide document
</commit_message>
<xml_diff>
--- a/Presentations/5.Quantum Risk Assesment.pptx
+++ b/Presentations/5.Quantum Risk Assesment.pptx
@@ -336,7 +336,7 @@
           <a:p>
             <a:fld id="{25D3A1D4-C2F1-4FBA-9F37-B87A976340E2}" type="datetimeFigureOut">
               <a:rPr lang="en-US" smtClean="0"/>
-              <a:t>1/21/26</a:t>
+              <a:t>2/2/26</a:t>
             </a:fld>
             <a:endParaRPr lang="en-US"/>
           </a:p>
@@ -506,7 +506,7 @@
             <a:fld id="{5288BB53-F264-D84E-8876-073A512183CA}" type="datetimeFigureOut">
               <a:rPr lang="en-US" smtClean="0"/>
               <a:pPr/>
-              <a:t>1/21/26</a:t>
+              <a:t>2/2/26</a:t>
             </a:fld>
             <a:endParaRPr lang="en-US" dirty="0"/>
           </a:p>
@@ -3109,6 +3109,132 @@
           </a:p>
         </p:txBody>
       </p:sp>
+      <p:pic>
+        <p:nvPicPr>
+          <p:cNvPr id="2" name="Picture 1">
+            <a:extLst>
+              <a:ext uri="{FF2B5EF4-FFF2-40B4-BE49-F238E27FC236}">
+                <a16:creationId xmlns:a16="http://schemas.microsoft.com/office/drawing/2014/main" id="{487E5AA0-F497-DBCD-1D5F-C4044F14C945}"/>
+              </a:ext>
+            </a:extLst>
+          </p:cNvPr>
+          <p:cNvPicPr>
+            <a:picLocks noChangeAspect="1"/>
+          </p:cNvPicPr>
+          <p:nvPr/>
+        </p:nvPicPr>
+        <p:blipFill>
+          <a:blip r:embed="rId3" cstate="email">
+            <a:extLst>
+              <a:ext uri="{28A0092B-C50C-407E-A947-70E740481C1C}">
+                <a14:useLocalDpi xmlns:a14="http://schemas.microsoft.com/office/drawing/2010/main"/>
+              </a:ext>
+            </a:extLst>
+          </a:blip>
+          <a:stretch>
+            <a:fillRect/>
+          </a:stretch>
+        </p:blipFill>
+        <p:spPr>
+          <a:xfrm>
+            <a:off x="12522200" y="176912"/>
+            <a:ext cx="1955800" cy="1623885"/>
+          </a:xfrm>
+          <a:prstGeom prst="rect">
+            <a:avLst/>
+          </a:prstGeom>
+          <a:ln w="25400">
+            <a:solidFill>
+              <a:schemeClr val="accent1"/>
+            </a:solidFill>
+          </a:ln>
+        </p:spPr>
+      </p:pic>
+      <p:pic>
+        <p:nvPicPr>
+          <p:cNvPr id="3" name="Picture 2">
+            <a:extLst>
+              <a:ext uri="{FF2B5EF4-FFF2-40B4-BE49-F238E27FC236}">
+                <a16:creationId xmlns:a16="http://schemas.microsoft.com/office/drawing/2014/main" id="{ACAEE086-4657-B556-E80D-BDD301CF0FC7}"/>
+              </a:ext>
+            </a:extLst>
+          </p:cNvPr>
+          <p:cNvPicPr>
+            <a:picLocks noChangeAspect="1"/>
+          </p:cNvPicPr>
+          <p:nvPr/>
+        </p:nvPicPr>
+        <p:blipFill>
+          <a:blip r:embed="rId4" cstate="email">
+            <a:extLst>
+              <a:ext uri="{28A0092B-C50C-407E-A947-70E740481C1C}">
+                <a14:useLocalDpi xmlns:a14="http://schemas.microsoft.com/office/drawing/2010/main"/>
+              </a:ext>
+            </a:extLst>
+          </a:blip>
+          <a:stretch>
+            <a:fillRect/>
+          </a:stretch>
+        </p:blipFill>
+        <p:spPr>
+          <a:xfrm>
+            <a:off x="12522200" y="1752600"/>
+            <a:ext cx="1955800" cy="912037"/>
+          </a:xfrm>
+          <a:prstGeom prst="rect">
+            <a:avLst/>
+          </a:prstGeom>
+          <a:ln w="25400">
+            <a:solidFill>
+              <a:schemeClr val="accent1"/>
+            </a:solidFill>
+          </a:ln>
+        </p:spPr>
+      </p:pic>
+      <p:pic>
+        <p:nvPicPr>
+          <p:cNvPr id="4" name="Picture 3">
+            <a:extLst>
+              <a:ext uri="{FF2B5EF4-FFF2-40B4-BE49-F238E27FC236}">
+                <a16:creationId xmlns:a16="http://schemas.microsoft.com/office/drawing/2014/main" id="{5C10824D-EF16-F3D8-9D05-A0FBB8C349EA}"/>
+              </a:ext>
+            </a:extLst>
+          </p:cNvPr>
+          <p:cNvPicPr>
+            <a:picLocks noChangeAspect="1"/>
+          </p:cNvPicPr>
+          <p:nvPr/>
+        </p:nvPicPr>
+        <p:blipFill>
+          <a:blip r:embed="rId5" cstate="email">
+            <a:extLst>
+              <a:ext uri="{28A0092B-C50C-407E-A947-70E740481C1C}">
+                <a14:useLocalDpi xmlns:a14="http://schemas.microsoft.com/office/drawing/2010/main"/>
+              </a:ext>
+            </a:extLst>
+          </a:blip>
+          <a:stretch>
+            <a:fillRect/>
+          </a:stretch>
+        </p:blipFill>
+        <p:spPr>
+          <a:xfrm>
+            <a:off x="12522200" y="2590800"/>
+            <a:ext cx="1955800" cy="954103"/>
+          </a:xfrm>
+          <a:prstGeom prst="rect">
+            <a:avLst/>
+          </a:prstGeom>
+          <a:solidFill>
+            <a:schemeClr val="bg2"/>
+          </a:solidFill>
+          <a:ln w="25400">
+            <a:solidFill>
+              <a:schemeClr val="accent1"/>
+            </a:solidFill>
+          </a:ln>
+        </p:spPr>
+      </p:pic>
     </p:spTree>
     <p:extLst>
       <p:ext uri="{BB962C8B-B14F-4D97-AF65-F5344CB8AC3E}">
@@ -3312,7 +3438,7 @@
           <p:nvPr/>
         </p:nvPicPr>
         <p:blipFill>
-          <a:blip r:embed="rId2" cstate="screen">
+          <a:blip r:embed="rId2" cstate="email">
             <a:extLst>
               <a:ext uri="{28A0092B-C50C-407E-A947-70E740481C1C}">
                 <a14:useLocalDpi xmlns:a14="http://schemas.microsoft.com/office/drawing/2010/main"/>
@@ -3497,7 +3623,7 @@
           <p:nvPr/>
         </p:nvPicPr>
         <p:blipFill>
-          <a:blip r:embed="rId2" cstate="screen">
+          <a:blip r:embed="rId2" cstate="email">
             <a:extLst>
               <a:ext uri="{28A0092B-C50C-407E-A947-70E740481C1C}">
                 <a14:useLocalDpi xmlns:a14="http://schemas.microsoft.com/office/drawing/2010/main"/>
@@ -5097,7 +5223,7 @@
           <p:nvPr/>
         </p:nvPicPr>
         <p:blipFill>
-          <a:blip r:embed="rId2" cstate="screen">
+          <a:blip r:embed="rId2" cstate="email">
             <a:extLst>
               <a:ext uri="{28A0092B-C50C-407E-A947-70E740481C1C}">
                 <a14:useLocalDpi xmlns:a14="http://schemas.microsoft.com/office/drawing/2010/main"/>
@@ -7198,7 +7324,7 @@
           <p:nvPr/>
         </p:nvPicPr>
         <p:blipFill>
-          <a:blip r:embed="rId2" cstate="screen">
+          <a:blip r:embed="rId2" cstate="email">
             <a:extLst>
               <a:ext uri="{28A0092B-C50C-407E-A947-70E740481C1C}">
                 <a14:useLocalDpi xmlns:a14="http://schemas.microsoft.com/office/drawing/2010/main"/>
@@ -7310,7 +7436,13 @@
           <p:nvPr/>
         </p:nvPicPr>
         <p:blipFill>
-          <a:blip r:embed="rId2"/>
+          <a:blip r:embed="rId2" cstate="email">
+            <a:extLst>
+              <a:ext uri="{28A0092B-C50C-407E-A947-70E740481C1C}">
+                <a14:useLocalDpi xmlns:a14="http://schemas.microsoft.com/office/drawing/2010/main"/>
+              </a:ext>
+            </a:extLst>
+          </a:blip>
           <a:stretch>
             <a:fillRect/>
           </a:stretch>
@@ -10809,7 +10941,7 @@
           <p:nvPr/>
         </p:nvPicPr>
         <p:blipFill>
-          <a:blip r:embed="rId2" cstate="screen">
+          <a:blip r:embed="rId2" cstate="email">
             <a:extLst>
               <a:ext uri="{28A0092B-C50C-407E-A947-70E740481C1C}">
                 <a14:useLocalDpi xmlns:a14="http://schemas.microsoft.com/office/drawing/2010/main"/>
@@ -10939,7 +11071,13 @@
           <p:nvPr/>
         </p:nvPicPr>
         <p:blipFill>
-          <a:blip r:embed="rId2"/>
+          <a:blip r:embed="rId2" cstate="email">
+            <a:extLst>
+              <a:ext uri="{28A0092B-C50C-407E-A947-70E740481C1C}">
+                <a14:useLocalDpi xmlns:a14="http://schemas.microsoft.com/office/drawing/2010/main"/>
+              </a:ext>
+            </a:extLst>
+          </a:blip>
           <a:stretch>
             <a:fillRect/>
           </a:stretch>
@@ -11638,7 +11776,7 @@
           <p:nvPr/>
         </p:nvPicPr>
         <p:blipFill>
-          <a:blip r:embed="rId2">
+          <a:blip r:embed="rId2" cstate="email">
             <a:extLst>
               <a:ext uri="{28A0092B-C50C-407E-A947-70E740481C1C}">
                 <a14:useLocalDpi xmlns:a14="http://schemas.microsoft.com/office/drawing/2010/main"/>
@@ -11836,7 +11974,7 @@
           <p:nvPr/>
         </p:nvPicPr>
         <p:blipFill>
-          <a:blip r:embed="rId2" cstate="screen">
+          <a:blip r:embed="rId2" cstate="email">
             <a:extLst>
               <a:ext uri="{28A0092B-C50C-407E-A947-70E740481C1C}">
                 <a14:useLocalDpi xmlns:a14="http://schemas.microsoft.com/office/drawing/2010/main"/>

</xml_diff>

<commit_message>
Update Quantum Risk Assessment presentation and cleanup
</commit_message>
<xml_diff>
--- a/Presentations/5.Quantum Risk Assesment.pptx
+++ b/Presentations/5.Quantum Risk Assesment.pptx
@@ -16,7 +16,7 @@
     <p:sldId id="141168166" r:id="rId4"/>
     <p:sldId id="141168160" r:id="rId5"/>
     <p:sldId id="141168177" r:id="rId6"/>
-    <p:sldId id="293" r:id="rId7"/>
+    <p:sldId id="141168184" r:id="rId7"/>
     <p:sldId id="141168179" r:id="rId8"/>
     <p:sldId id="141168167" r:id="rId9"/>
     <p:sldId id="141168174" r:id="rId10"/>
@@ -336,7 +336,7 @@
           <a:p>
             <a:fld id="{25D3A1D4-C2F1-4FBA-9F37-B87A976340E2}" type="datetimeFigureOut">
               <a:rPr lang="en-US" smtClean="0"/>
-              <a:t>2/2/26</a:t>
+              <a:t>2/8/26</a:t>
             </a:fld>
             <a:endParaRPr lang="en-US"/>
           </a:p>
@@ -506,7 +506,7 @@
             <a:fld id="{5288BB53-F264-D84E-8876-073A512183CA}" type="datetimeFigureOut">
               <a:rPr lang="en-US" smtClean="0"/>
               <a:pPr/>
-              <a:t>2/2/26</a:t>
+              <a:t>2/8/26</a:t>
             </a:fld>
             <a:endParaRPr lang="en-US" dirty="0"/>
           </a:p>
@@ -10025,17 +10025,11 @@
           <p:cNvGraphicFramePr>
             <a:graphicFrameLocks noGrp="1"/>
           </p:cNvGraphicFramePr>
-          <p:nvPr>
-            <p:extLst>
-              <p:ext uri="{D42A27DB-BD31-4B8C-83A1-F6EECF244321}">
-                <p14:modId xmlns:p14="http://schemas.microsoft.com/office/powerpoint/2010/main" val="2043175073"/>
-              </p:ext>
-            </p:extLst>
-          </p:nvPr>
+          <p:nvPr/>
         </p:nvGraphicFramePr>
         <p:xfrm>
-          <a:off x="381000" y="796978"/>
-          <a:ext cx="13487400" cy="6899222"/>
+          <a:off x="457200" y="664316"/>
+          <a:ext cx="13487400" cy="7412884"/>
         </p:xfrm>
         <a:graphic>
           <a:graphicData uri="http://schemas.openxmlformats.org/drawingml/2006/table">
@@ -10044,28 +10038,28 @@
                 <a:tableStyleId>{5C22544A-7EE6-4342-B048-85BDC9FD1C3A}</a:tableStyleId>
               </a:tblPr>
               <a:tblGrid>
-                <a:gridCol w="1905931">
+                <a:gridCol w="1447800">
                   <a:extLst>
                     <a:ext uri="{9D8B030D-6E8A-4147-A177-3AD203B41FA5}">
                       <a16:colId xmlns:a16="http://schemas.microsoft.com/office/drawing/2014/main" val="1549872932"/>
                     </a:ext>
                   </a:extLst>
                 </a:gridCol>
-                <a:gridCol w="3256554">
+                <a:gridCol w="2971800">
                   <a:extLst>
                     <a:ext uri="{9D8B030D-6E8A-4147-A177-3AD203B41FA5}">
                       <a16:colId xmlns:a16="http://schemas.microsoft.com/office/drawing/2014/main" val="3971865718"/>
                     </a:ext>
                   </a:extLst>
                 </a:gridCol>
-                <a:gridCol w="4160105">
+                <a:gridCol w="3733800">
                   <a:extLst>
                     <a:ext uri="{9D8B030D-6E8A-4147-A177-3AD203B41FA5}">
                       <a16:colId xmlns:a16="http://schemas.microsoft.com/office/drawing/2014/main" val="899511941"/>
                     </a:ext>
                   </a:extLst>
                 </a:gridCol>
-                <a:gridCol w="4164810">
+                <a:gridCol w="5334000">
                   <a:extLst>
                     <a:ext uri="{9D8B030D-6E8A-4147-A177-3AD203B41FA5}">
                       <a16:colId xmlns:a16="http://schemas.microsoft.com/office/drawing/2014/main" val="4137139247"/>
@@ -10073,7 +10067,7 @@
                   </a:extLst>
                 </a:gridCol>
               </a:tblGrid>
-              <a:tr h="869373">
+              <a:tr h="346022">
                 <a:tc>
                   <a:txBody>
                     <a:bodyPr/>
@@ -10083,6 +10077,8 @@
                       <a:r>
                         <a:rPr lang="en-US" sz="1600" b="1" u="none" strike="noStrike">
                           <a:effectLst/>
+                          <a:latin typeface="Calibri" panose="020F0502020204030204" pitchFamily="34" charset="0"/>
+                          <a:cs typeface="Calibri" panose="020F0502020204030204" pitchFamily="34" charset="0"/>
                         </a:rPr>
                         <a:t>Region / Body</a:t>
                       </a:r>
@@ -10091,7 +10087,8 @@
                           <a:srgbClr val="000000"/>
                         </a:solidFill>
                         <a:effectLst/>
-                        <a:latin typeface="Aptos Narrow" panose="020B0004020202020204" pitchFamily="34" charset="0"/>
+                        <a:latin typeface="Calibri" panose="020F0502020204030204" pitchFamily="34" charset="0"/>
+                        <a:cs typeface="Calibri" panose="020F0502020204030204" pitchFamily="34" charset="0"/>
                       </a:endParaRPr>
                     </a:p>
                   </a:txBody>
@@ -10106,6 +10103,8 @@
                       <a:r>
                         <a:rPr lang="en-US" sz="1800" b="1" u="none" strike="noStrike">
                           <a:effectLst/>
+                          <a:latin typeface="Calibri" panose="020F0502020204030204" pitchFamily="34" charset="0"/>
+                          <a:cs typeface="Calibri" panose="020F0502020204030204" pitchFamily="34" charset="0"/>
                         </a:rPr>
                         <a:t>Organization</a:t>
                       </a:r>
@@ -10114,7 +10113,8 @@
                           <a:srgbClr val="000000"/>
                         </a:solidFill>
                         <a:effectLst/>
-                        <a:latin typeface="Aptos Narrow" panose="020B0004020202020204" pitchFamily="34" charset="0"/>
+                        <a:latin typeface="Calibri" panose="020F0502020204030204" pitchFamily="34" charset="0"/>
+                        <a:cs typeface="Calibri" panose="020F0502020204030204" pitchFamily="34" charset="0"/>
                       </a:endParaRPr>
                     </a:p>
                   </a:txBody>
@@ -10129,6 +10129,8 @@
                       <a:r>
                         <a:rPr lang="en-US" sz="1800" b="1" u="none" strike="noStrike" dirty="0">
                           <a:effectLst/>
+                          <a:latin typeface="Calibri" panose="020F0502020204030204" pitchFamily="34" charset="0"/>
+                          <a:cs typeface="Calibri" panose="020F0502020204030204" pitchFamily="34" charset="0"/>
                         </a:rPr>
                         <a:t>Key Initiatives &amp; Standards</a:t>
                       </a:r>
@@ -10137,7 +10139,8 @@
                           <a:srgbClr val="000000"/>
                         </a:solidFill>
                         <a:effectLst/>
-                        <a:latin typeface="Aptos Narrow" panose="020B0004020202020204" pitchFamily="34" charset="0"/>
+                        <a:latin typeface="Calibri" panose="020F0502020204030204" pitchFamily="34" charset="0"/>
+                        <a:cs typeface="Calibri" panose="020F0502020204030204" pitchFamily="34" charset="0"/>
                       </a:endParaRPr>
                     </a:p>
                   </a:txBody>
@@ -10152,24 +10155,18 @@
                       <a:r>
                         <a:rPr lang="en-US" sz="1800" b="1" u="none" strike="noStrike" dirty="0">
                           <a:effectLst/>
-                        </a:rPr>
-                        <a:t>Notable Algorithms </a:t>
-                      </a:r>
-                    </a:p>
-                    <a:p>
-                      <a:pPr algn="l" fontAlgn="ctr"/>
-                      <a:r>
-                        <a:rPr lang="en-US" sz="1800" b="1" u="none" strike="noStrike" dirty="0">
-                          <a:effectLst/>
-                        </a:rPr>
-                        <a:t>Specifications</a:t>
+                          <a:latin typeface="Calibri" panose="020F0502020204030204" pitchFamily="34" charset="0"/>
+                          <a:cs typeface="Calibri" panose="020F0502020204030204" pitchFamily="34" charset="0"/>
+                        </a:rPr>
+                        <a:t>Notable Algorithms Specifications</a:t>
                       </a:r>
                       <a:endParaRPr lang="en-US" sz="1800" b="1" i="0" u="none" strike="noStrike" dirty="0">
                         <a:solidFill>
                           <a:srgbClr val="000000"/>
                         </a:solidFill>
                         <a:effectLst/>
-                        <a:latin typeface="Aptos Narrow" panose="020B0004020202020204" pitchFamily="34" charset="0"/>
+                        <a:latin typeface="Calibri" panose="020F0502020204030204" pitchFamily="34" charset="0"/>
+                        <a:cs typeface="Calibri" panose="020F0502020204030204" pitchFamily="34" charset="0"/>
                       </a:endParaRPr>
                     </a:p>
                   </a:txBody>
@@ -10181,7 +10178,7 @@
                   </a:ext>
                 </a:extLst>
               </a:tr>
-              <a:tr h="1679843">
+              <a:tr h="1008242">
                 <a:tc>
                   <a:txBody>
                     <a:bodyPr/>
@@ -10189,17 +10186,20 @@
                     <a:p>
                       <a:pPr algn="ctr" fontAlgn="ctr"/>
                       <a:r>
-                        <a:rPr lang="en-US" sz="1600" b="1" u="none" strike="noStrike">
-                          <a:effectLst/>
+                        <a:rPr lang="en-US" sz="1600" b="1" u="none" strike="noStrike" dirty="0">
+                          <a:effectLst/>
+                          <a:latin typeface="Calibri" panose="020F0502020204030204" pitchFamily="34" charset="0"/>
+                          <a:cs typeface="Calibri" panose="020F0502020204030204" pitchFamily="34" charset="0"/>
                         </a:rPr>
                         <a:t>United States</a:t>
                       </a:r>
-                      <a:endParaRPr lang="en-US" sz="1600" b="1" i="0" u="none" strike="noStrike">
+                      <a:endParaRPr lang="en-US" sz="1600" b="1" i="0" u="none" strike="noStrike" dirty="0">
                         <a:solidFill>
                           <a:srgbClr val="000000"/>
                         </a:solidFill>
                         <a:effectLst/>
-                        <a:latin typeface="Aptos Narrow" panose="020B0004020202020204" pitchFamily="34" charset="0"/>
+                        <a:latin typeface="Calibri" panose="020F0502020204030204" pitchFamily="34" charset="0"/>
+                        <a:cs typeface="Calibri" panose="020F0502020204030204" pitchFamily="34" charset="0"/>
                       </a:endParaRPr>
                     </a:p>
                   </a:txBody>
@@ -10214,12 +10214,16 @@
                       <a:r>
                         <a:rPr lang="en-US" sz="1600" b="1" u="none" strike="noStrike" dirty="0">
                           <a:effectLst/>
+                          <a:latin typeface="Calibri" panose="020F0502020204030204" pitchFamily="34" charset="0"/>
+                          <a:cs typeface="Calibri" panose="020F0502020204030204" pitchFamily="34" charset="0"/>
                         </a:rPr>
                         <a:t>NIST</a:t>
                       </a:r>
                       <a:r>
                         <a:rPr lang="en-US" sz="1600" u="none" strike="noStrike" dirty="0">
                           <a:effectLst/>
+                          <a:latin typeface="Calibri" panose="020F0502020204030204" pitchFamily="34" charset="0"/>
+                          <a:cs typeface="Calibri" panose="020F0502020204030204" pitchFamily="34" charset="0"/>
                         </a:rPr>
                         <a:t> (National Institute of Standards and Technology)</a:t>
                       </a:r>
@@ -10228,7 +10232,8 @@
                           <a:srgbClr val="000000"/>
                         </a:solidFill>
                         <a:effectLst/>
-                        <a:latin typeface="Aptos Narrow" panose="020B0004020202020204" pitchFamily="34" charset="0"/>
+                        <a:latin typeface="Calibri" panose="020F0502020204030204" pitchFamily="34" charset="0"/>
+                        <a:cs typeface="Calibri" panose="020F0502020204030204" pitchFamily="34" charset="0"/>
                       </a:endParaRPr>
                     </a:p>
                   </a:txBody>
@@ -10243,93 +10248,125 @@
                       <a:r>
                         <a:rPr lang="en-US" sz="1600" b="1" u="none" strike="noStrike" dirty="0">
                           <a:effectLst/>
+                          <a:latin typeface="Calibri" panose="020F0502020204030204" pitchFamily="34" charset="0"/>
+                          <a:cs typeface="Calibri" panose="020F0502020204030204" pitchFamily="34" charset="0"/>
                         </a:rPr>
                         <a:t>PQC</a:t>
                       </a:r>
                       <a:r>
                         <a:rPr lang="en-US" sz="1600" u="none" strike="noStrike" dirty="0">
                           <a:effectLst/>
+                          <a:latin typeface="Calibri" panose="020F0502020204030204" pitchFamily="34" charset="0"/>
+                          <a:cs typeface="Calibri" panose="020F0502020204030204" pitchFamily="34" charset="0"/>
                         </a:rPr>
                         <a:t> Standards </a:t>
                       </a:r>
                       <a:br>
                         <a:rPr lang="en-US" sz="1600" u="none" strike="noStrike" dirty="0">
                           <a:effectLst/>
+                          <a:latin typeface="Calibri" panose="020F0502020204030204" pitchFamily="34" charset="0"/>
+                          <a:cs typeface="Calibri" panose="020F0502020204030204" pitchFamily="34" charset="0"/>
                         </a:rPr>
                       </a:br>
                       <a:r>
                         <a:rPr lang="en-US" sz="1600" u="none" strike="noStrike" dirty="0">
                           <a:effectLst/>
+                          <a:latin typeface="Calibri" panose="020F0502020204030204" pitchFamily="34" charset="0"/>
+                          <a:cs typeface="Calibri" panose="020F0502020204030204" pitchFamily="34" charset="0"/>
                         </a:rPr>
                         <a:t>- </a:t>
                       </a:r>
                       <a:r>
                         <a:rPr lang="en-US" sz="1600" b="1" u="none" strike="noStrike" dirty="0">
                           <a:effectLst/>
+                          <a:latin typeface="Calibri" panose="020F0502020204030204" pitchFamily="34" charset="0"/>
+                          <a:cs typeface="Calibri" panose="020F0502020204030204" pitchFamily="34" charset="0"/>
                         </a:rPr>
                         <a:t>FIPS 203</a:t>
                       </a:r>
                       <a:r>
                         <a:rPr lang="en-US" sz="1600" u="none" strike="noStrike" dirty="0">
                           <a:effectLst/>
+                          <a:latin typeface="Calibri" panose="020F0502020204030204" pitchFamily="34" charset="0"/>
+                          <a:cs typeface="Calibri" panose="020F0502020204030204" pitchFamily="34" charset="0"/>
                         </a:rPr>
                         <a:t>: ML-KEM (Kyber)</a:t>
                       </a:r>
                       <a:br>
                         <a:rPr lang="en-US" sz="1600" u="none" strike="noStrike" dirty="0">
                           <a:effectLst/>
+                          <a:latin typeface="Calibri" panose="020F0502020204030204" pitchFamily="34" charset="0"/>
+                          <a:cs typeface="Calibri" panose="020F0502020204030204" pitchFamily="34" charset="0"/>
                         </a:rPr>
                       </a:br>
                       <a:r>
                         <a:rPr lang="en-US" sz="1600" u="none" strike="noStrike" dirty="0">
                           <a:effectLst/>
+                          <a:latin typeface="Calibri" panose="020F0502020204030204" pitchFamily="34" charset="0"/>
+                          <a:cs typeface="Calibri" panose="020F0502020204030204" pitchFamily="34" charset="0"/>
                         </a:rPr>
                         <a:t>- </a:t>
                       </a:r>
                       <a:r>
                         <a:rPr lang="en-US" sz="1600" b="1" u="none" strike="noStrike" dirty="0">
                           <a:effectLst/>
+                          <a:latin typeface="Calibri" panose="020F0502020204030204" pitchFamily="34" charset="0"/>
+                          <a:cs typeface="Calibri" panose="020F0502020204030204" pitchFamily="34" charset="0"/>
                         </a:rPr>
                         <a:t>FIPS 204</a:t>
                       </a:r>
                       <a:r>
                         <a:rPr lang="en-US" sz="1600" u="none" strike="noStrike" dirty="0">
                           <a:effectLst/>
+                          <a:latin typeface="Calibri" panose="020F0502020204030204" pitchFamily="34" charset="0"/>
+                          <a:cs typeface="Calibri" panose="020F0502020204030204" pitchFamily="34" charset="0"/>
                         </a:rPr>
                         <a:t>: ML-DSA (</a:t>
                       </a:r>
                       <a:r>
                         <a:rPr lang="en-US" sz="1600" u="none" strike="noStrike" dirty="0" err="1">
                           <a:effectLst/>
+                          <a:latin typeface="Calibri" panose="020F0502020204030204" pitchFamily="34" charset="0"/>
+                          <a:cs typeface="Calibri" panose="020F0502020204030204" pitchFamily="34" charset="0"/>
                         </a:rPr>
                         <a:t>Dilithium</a:t>
                       </a:r>
                       <a:r>
                         <a:rPr lang="en-US" sz="1600" u="none" strike="noStrike" dirty="0">
                           <a:effectLst/>
+                          <a:latin typeface="Calibri" panose="020F0502020204030204" pitchFamily="34" charset="0"/>
+                          <a:cs typeface="Calibri" panose="020F0502020204030204" pitchFamily="34" charset="0"/>
                         </a:rPr>
                         <a:t>)</a:t>
                       </a:r>
                       <a:br>
                         <a:rPr lang="en-US" sz="1600" u="none" strike="noStrike" dirty="0">
                           <a:effectLst/>
+                          <a:latin typeface="Calibri" panose="020F0502020204030204" pitchFamily="34" charset="0"/>
+                          <a:cs typeface="Calibri" panose="020F0502020204030204" pitchFamily="34" charset="0"/>
                         </a:rPr>
                       </a:br>
                       <a:r>
                         <a:rPr lang="en-US" sz="1600" u="none" strike="noStrike" dirty="0">
                           <a:effectLst/>
+                          <a:latin typeface="Calibri" panose="020F0502020204030204" pitchFamily="34" charset="0"/>
+                          <a:cs typeface="Calibri" panose="020F0502020204030204" pitchFamily="34" charset="0"/>
                         </a:rPr>
                         <a:t>- </a:t>
                       </a:r>
                       <a:r>
                         <a:rPr lang="en-US" sz="1600" b="1" u="none" strike="noStrike" dirty="0">
                           <a:effectLst/>
+                          <a:latin typeface="Calibri" panose="020F0502020204030204" pitchFamily="34" charset="0"/>
+                          <a:cs typeface="Calibri" panose="020F0502020204030204" pitchFamily="34" charset="0"/>
                         </a:rPr>
                         <a:t>FIPS 205</a:t>
                       </a:r>
                       <a:r>
                         <a:rPr lang="en-US" sz="1600" u="none" strike="noStrike" dirty="0">
                           <a:effectLst/>
+                          <a:latin typeface="Calibri" panose="020F0502020204030204" pitchFamily="34" charset="0"/>
+                          <a:cs typeface="Calibri" panose="020F0502020204030204" pitchFamily="34" charset="0"/>
                         </a:rPr>
                         <a:t>: SLH-DSA (SPHINCS+)</a:t>
                       </a:r>
@@ -10338,7 +10375,8 @@
                           <a:srgbClr val="000000"/>
                         </a:solidFill>
                         <a:effectLst/>
-                        <a:latin typeface="Aptos Narrow" panose="020B0004020202020204" pitchFamily="34" charset="0"/>
+                        <a:latin typeface="Calibri" panose="020F0502020204030204" pitchFamily="34" charset="0"/>
+                        <a:cs typeface="Calibri" panose="020F0502020204030204" pitchFamily="34" charset="0"/>
                       </a:endParaRPr>
                     </a:p>
                   </a:txBody>
@@ -10353,76 +10391,102 @@
                       <a:r>
                         <a:rPr lang="en-US" sz="1600" u="none" strike="noStrike" dirty="0">
                           <a:effectLst/>
+                          <a:latin typeface="Calibri" panose="020F0502020204030204" pitchFamily="34" charset="0"/>
+                          <a:cs typeface="Calibri" panose="020F0502020204030204" pitchFamily="34" charset="0"/>
                         </a:rPr>
                         <a:t>‘-</a:t>
                       </a:r>
                       <a:r>
                         <a:rPr lang="en-US" sz="1600" b="1" u="none" strike="noStrike" dirty="0">
                           <a:effectLst/>
+                          <a:latin typeface="Calibri" panose="020F0502020204030204" pitchFamily="34" charset="0"/>
+                          <a:cs typeface="Calibri" panose="020F0502020204030204" pitchFamily="34" charset="0"/>
                         </a:rPr>
                         <a:t>ML-KEM (Kyber)</a:t>
                       </a:r>
                       <a:r>
                         <a:rPr lang="en-US" sz="1600" u="none" strike="noStrike" dirty="0">
                           <a:effectLst/>
+                          <a:latin typeface="Calibri" panose="020F0502020204030204" pitchFamily="34" charset="0"/>
+                          <a:cs typeface="Calibri" panose="020F0502020204030204" pitchFamily="34" charset="0"/>
                         </a:rPr>
                         <a:t>: Key encapsulation</a:t>
                       </a:r>
                       <a:br>
                         <a:rPr lang="en-US" sz="1600" u="none" strike="noStrike" dirty="0">
                           <a:effectLst/>
+                          <a:latin typeface="Calibri" panose="020F0502020204030204" pitchFamily="34" charset="0"/>
+                          <a:cs typeface="Calibri" panose="020F0502020204030204" pitchFamily="34" charset="0"/>
                         </a:rPr>
                       </a:br>
                       <a:r>
                         <a:rPr lang="en-US" sz="1600" u="none" strike="noStrike" dirty="0">
                           <a:effectLst/>
+                          <a:latin typeface="Calibri" panose="020F0502020204030204" pitchFamily="34" charset="0"/>
+                          <a:cs typeface="Calibri" panose="020F0502020204030204" pitchFamily="34" charset="0"/>
                         </a:rPr>
                         <a:t>- </a:t>
                       </a:r>
                       <a:r>
                         <a:rPr lang="en-US" sz="1600" b="1" u="none" strike="noStrike" dirty="0">
                           <a:effectLst/>
+                          <a:latin typeface="Calibri" panose="020F0502020204030204" pitchFamily="34" charset="0"/>
+                          <a:cs typeface="Calibri" panose="020F0502020204030204" pitchFamily="34" charset="0"/>
                         </a:rPr>
                         <a:t>ML-DSA (</a:t>
                       </a:r>
                       <a:r>
                         <a:rPr lang="en-US" sz="1600" b="1" u="none" strike="noStrike" dirty="0" err="1">
                           <a:effectLst/>
+                          <a:latin typeface="Calibri" panose="020F0502020204030204" pitchFamily="34" charset="0"/>
+                          <a:cs typeface="Calibri" panose="020F0502020204030204" pitchFamily="34" charset="0"/>
                         </a:rPr>
                         <a:t>Dilithium</a:t>
                       </a:r>
                       <a:r>
                         <a:rPr lang="en-US" sz="1600" b="1" u="none" strike="noStrike" dirty="0">
                           <a:effectLst/>
+                          <a:latin typeface="Calibri" panose="020F0502020204030204" pitchFamily="34" charset="0"/>
+                          <a:cs typeface="Calibri" panose="020F0502020204030204" pitchFamily="34" charset="0"/>
                         </a:rPr>
                         <a:t>)</a:t>
                       </a:r>
                       <a:r>
                         <a:rPr lang="en-US" sz="1600" u="none" strike="noStrike" dirty="0">
                           <a:effectLst/>
+                          <a:latin typeface="Calibri" panose="020F0502020204030204" pitchFamily="34" charset="0"/>
+                          <a:cs typeface="Calibri" panose="020F0502020204030204" pitchFamily="34" charset="0"/>
                         </a:rPr>
                         <a:t>: Digital signatures</a:t>
                       </a:r>
                       <a:br>
                         <a:rPr lang="en-US" sz="1600" u="none" strike="noStrike" dirty="0">
                           <a:effectLst/>
+                          <a:latin typeface="Calibri" panose="020F0502020204030204" pitchFamily="34" charset="0"/>
+                          <a:cs typeface="Calibri" panose="020F0502020204030204" pitchFamily="34" charset="0"/>
                         </a:rPr>
                       </a:br>
                       <a:r>
                         <a:rPr lang="en-US" sz="1600" u="none" strike="noStrike" dirty="0">
                           <a:effectLst/>
+                          <a:latin typeface="Calibri" panose="020F0502020204030204" pitchFamily="34" charset="0"/>
+                          <a:cs typeface="Calibri" panose="020F0502020204030204" pitchFamily="34" charset="0"/>
                         </a:rPr>
                         <a:t>- </a:t>
                       </a:r>
                       <a:r>
                         <a:rPr lang="en-US" sz="1600" b="1" u="none" strike="noStrike" dirty="0">
                           <a:effectLst/>
+                          <a:latin typeface="Calibri" panose="020F0502020204030204" pitchFamily="34" charset="0"/>
+                          <a:cs typeface="Calibri" panose="020F0502020204030204" pitchFamily="34" charset="0"/>
                         </a:rPr>
                         <a:t>SLH-DSA (SPHINCS+)</a:t>
                       </a:r>
                       <a:r>
                         <a:rPr lang="en-US" sz="1600" u="none" strike="noStrike" dirty="0">
                           <a:effectLst/>
+                          <a:latin typeface="Calibri" panose="020F0502020204030204" pitchFamily="34" charset="0"/>
+                          <a:cs typeface="Calibri" panose="020F0502020204030204" pitchFamily="34" charset="0"/>
                         </a:rPr>
                         <a:t>: Stateless hash-based signatures</a:t>
                       </a:r>
@@ -10431,7 +10495,8 @@
                           <a:srgbClr val="000000"/>
                         </a:solidFill>
                         <a:effectLst/>
-                        <a:latin typeface="Aptos Narrow" panose="020B0004020202020204" pitchFamily="34" charset="0"/>
+                        <a:latin typeface="Calibri" panose="020F0502020204030204" pitchFamily="34" charset="0"/>
+                        <a:cs typeface="Calibri" panose="020F0502020204030204" pitchFamily="34" charset="0"/>
                       </a:endParaRPr>
                     </a:p>
                   </a:txBody>
@@ -10443,7 +10508,7 @@
                   </a:ext>
                 </a:extLst>
               </a:tr>
-              <a:tr h="1441559">
+              <a:tr h="838200">
                 <a:tc rowSpan="2">
                   <a:txBody>
                     <a:bodyPr/>
@@ -10453,6 +10518,8 @@
                       <a:r>
                         <a:rPr lang="en-US" sz="1600" b="1" u="none" strike="noStrike">
                           <a:effectLst/>
+                          <a:latin typeface="Calibri" panose="020F0502020204030204" pitchFamily="34" charset="0"/>
+                          <a:cs typeface="Calibri" panose="020F0502020204030204" pitchFamily="34" charset="0"/>
                         </a:rPr>
                         <a:t>European Union</a:t>
                       </a:r>
@@ -10461,7 +10528,8 @@
                           <a:srgbClr val="000000"/>
                         </a:solidFill>
                         <a:effectLst/>
-                        <a:latin typeface="Aptos Narrow" panose="020B0004020202020204" pitchFamily="34" charset="0"/>
+                        <a:latin typeface="Calibri" panose="020F0502020204030204" pitchFamily="34" charset="0"/>
+                        <a:cs typeface="Calibri" panose="020F0502020204030204" pitchFamily="34" charset="0"/>
                       </a:endParaRPr>
                     </a:p>
                   </a:txBody>
@@ -10476,12 +10544,16 @@
                       <a:r>
                         <a:rPr lang="en-US" sz="1600" b="1" u="none" strike="noStrike" dirty="0">
                           <a:effectLst/>
+                          <a:latin typeface="Calibri" panose="020F0502020204030204" pitchFamily="34" charset="0"/>
+                          <a:cs typeface="Calibri" panose="020F0502020204030204" pitchFamily="34" charset="0"/>
                         </a:rPr>
                         <a:t>ETSI</a:t>
                       </a:r>
                       <a:r>
                         <a:rPr lang="en-US" sz="1600" u="none" strike="noStrike" dirty="0">
                           <a:effectLst/>
+                          <a:latin typeface="Calibri" panose="020F0502020204030204" pitchFamily="34" charset="0"/>
+                          <a:cs typeface="Calibri" panose="020F0502020204030204" pitchFamily="34" charset="0"/>
                         </a:rPr>
                         <a:t> (European Telecommunications Standards Institute)</a:t>
                       </a:r>
@@ -10490,7 +10562,8 @@
                           <a:srgbClr val="000000"/>
                         </a:solidFill>
                         <a:effectLst/>
-                        <a:latin typeface="Aptos Narrow" panose="020B0004020202020204" pitchFamily="34" charset="0"/>
+                        <a:latin typeface="Calibri" panose="020F0502020204030204" pitchFamily="34" charset="0"/>
+                        <a:cs typeface="Calibri" panose="020F0502020204030204" pitchFamily="34" charset="0"/>
                       </a:endParaRPr>
                     </a:p>
                   </a:txBody>
@@ -10505,41 +10578,55 @@
                       <a:r>
                         <a:rPr lang="en-US" sz="1600" u="none" strike="noStrike" dirty="0">
                           <a:effectLst/>
+                          <a:latin typeface="Calibri" panose="020F0502020204030204" pitchFamily="34" charset="0"/>
+                          <a:cs typeface="Calibri" panose="020F0502020204030204" pitchFamily="34" charset="0"/>
                         </a:rPr>
                         <a:t>Quantum-Safe Cryptography (</a:t>
                       </a:r>
                       <a:r>
                         <a:rPr lang="en-US" sz="1600" b="1" u="none" strike="noStrike" dirty="0">
                           <a:effectLst/>
+                          <a:latin typeface="Calibri" panose="020F0502020204030204" pitchFamily="34" charset="0"/>
+                          <a:cs typeface="Calibri" panose="020F0502020204030204" pitchFamily="34" charset="0"/>
                         </a:rPr>
                         <a:t>QSC</a:t>
                       </a:r>
                       <a:r>
                         <a:rPr lang="en-US" sz="1600" u="none" strike="noStrike" dirty="0">
                           <a:effectLst/>
+                          <a:latin typeface="Calibri" panose="020F0502020204030204" pitchFamily="34" charset="0"/>
+                          <a:cs typeface="Calibri" panose="020F0502020204030204" pitchFamily="34" charset="0"/>
                         </a:rPr>
                         <a:t>) </a:t>
                       </a:r>
                       <a:br>
                         <a:rPr lang="en-US" sz="1600" u="none" strike="noStrike" dirty="0">
                           <a:effectLst/>
+                          <a:latin typeface="Calibri" panose="020F0502020204030204" pitchFamily="34" charset="0"/>
+                          <a:cs typeface="Calibri" panose="020F0502020204030204" pitchFamily="34" charset="0"/>
                         </a:rPr>
                       </a:br>
                       <a:r>
                         <a:rPr lang="en-US" sz="1600" u="none" strike="noStrike" dirty="0">
                           <a:effectLst/>
+                          <a:latin typeface="Calibri" panose="020F0502020204030204" pitchFamily="34" charset="0"/>
+                          <a:cs typeface="Calibri" panose="020F0502020204030204" pitchFamily="34" charset="0"/>
                         </a:rPr>
                         <a:t>- </a:t>
                       </a:r>
                       <a:r>
                         <a:rPr lang="en-US" sz="1600" b="1" u="none" strike="noStrike" dirty="0">
                           <a:effectLst/>
+                          <a:latin typeface="Calibri" panose="020F0502020204030204" pitchFamily="34" charset="0"/>
+                          <a:cs typeface="Calibri" panose="020F0502020204030204" pitchFamily="34" charset="0"/>
                         </a:rPr>
                         <a:t>ETSI TS 104 015</a:t>
                       </a:r>
                       <a:r>
                         <a:rPr lang="en-US" sz="1600" u="none" strike="noStrike" dirty="0">
                           <a:effectLst/>
+                          <a:latin typeface="Calibri" panose="020F0502020204030204" pitchFamily="34" charset="0"/>
+                          <a:cs typeface="Calibri" panose="020F0502020204030204" pitchFamily="34" charset="0"/>
                         </a:rPr>
                         <a:t>: Efficient Quantum-Safe Hybrid Key Exchanges with Hidden Access Policies</a:t>
                       </a:r>
@@ -10548,7 +10635,8 @@
                           <a:srgbClr val="000000"/>
                         </a:solidFill>
                         <a:effectLst/>
-                        <a:latin typeface="Aptos Narrow" panose="020B0004020202020204" pitchFamily="34" charset="0"/>
+                        <a:latin typeface="Calibri" panose="020F0502020204030204" pitchFamily="34" charset="0"/>
+                        <a:cs typeface="Calibri" panose="020F0502020204030204" pitchFamily="34" charset="0"/>
                       </a:endParaRPr>
                     </a:p>
                   </a:txBody>
@@ -10563,12 +10651,16 @@
                       <a:r>
                         <a:rPr lang="en-US" sz="1600" b="1" u="none" strike="noStrike" dirty="0" err="1">
                           <a:effectLst/>
+                          <a:latin typeface="Calibri" panose="020F0502020204030204" pitchFamily="34" charset="0"/>
+                          <a:cs typeface="Calibri" panose="020F0502020204030204" pitchFamily="34" charset="0"/>
                         </a:rPr>
                         <a:t>Covercrypt</a:t>
                       </a:r>
                       <a:r>
                         <a:rPr lang="en-US" sz="1600" u="none" strike="noStrike" dirty="0">
                           <a:effectLst/>
+                          <a:latin typeface="Calibri" panose="020F0502020204030204" pitchFamily="34" charset="0"/>
+                          <a:cs typeface="Calibri" panose="020F0502020204030204" pitchFamily="34" charset="0"/>
                         </a:rPr>
                         <a:t>: Hybrid key encapsulation mechanism with access control</a:t>
                       </a:r>
@@ -10577,7 +10669,8 @@
                           <a:srgbClr val="000000"/>
                         </a:solidFill>
                         <a:effectLst/>
-                        <a:latin typeface="Aptos Narrow" panose="020B0004020202020204" pitchFamily="34" charset="0"/>
+                        <a:latin typeface="Calibri" panose="020F0502020204030204" pitchFamily="34" charset="0"/>
+                        <a:cs typeface="Calibri" panose="020F0502020204030204" pitchFamily="34" charset="0"/>
                       </a:endParaRPr>
                     </a:p>
                   </a:txBody>
@@ -10609,12 +10702,16 @@
                       <a:r>
                         <a:rPr lang="en-US" sz="1600" b="1" u="none" strike="noStrike" dirty="0">
                           <a:effectLst/>
+                          <a:latin typeface="Calibri" panose="020F0502020204030204" pitchFamily="34" charset="0"/>
+                          <a:cs typeface="Calibri" panose="020F0502020204030204" pitchFamily="34" charset="0"/>
                         </a:rPr>
                         <a:t>ENISA</a:t>
                       </a:r>
                       <a:r>
                         <a:rPr lang="en-US" sz="1600" u="none" strike="noStrike" dirty="0">
                           <a:effectLst/>
+                          <a:latin typeface="Calibri" panose="020F0502020204030204" pitchFamily="34" charset="0"/>
+                          <a:cs typeface="Calibri" panose="020F0502020204030204" pitchFamily="34" charset="0"/>
                         </a:rPr>
                         <a:t> (European Union Agency for Cybersecurity)</a:t>
                       </a:r>
@@ -10623,7 +10720,8 @@
                           <a:srgbClr val="000000"/>
                         </a:solidFill>
                         <a:effectLst/>
-                        <a:latin typeface="Aptos Narrow" panose="020B0004020202020204" pitchFamily="34" charset="0"/>
+                        <a:latin typeface="Calibri" panose="020F0502020204030204" pitchFamily="34" charset="0"/>
+                        <a:cs typeface="Calibri" panose="020F0502020204030204" pitchFamily="34" charset="0"/>
                       </a:endParaRPr>
                     </a:p>
                   </a:txBody>
@@ -10638,12 +10736,16 @@
                       <a:r>
                         <a:rPr lang="en-US" sz="1600" b="0" u="none" strike="noStrike" dirty="0">
                           <a:effectLst/>
+                          <a:latin typeface="Calibri" panose="020F0502020204030204" pitchFamily="34" charset="0"/>
+                          <a:cs typeface="Calibri" panose="020F0502020204030204" pitchFamily="34" charset="0"/>
                         </a:rPr>
                         <a:t>PQC</a:t>
                       </a:r>
                       <a:r>
                         <a:rPr lang="en-US" sz="1600" u="none" strike="noStrike" dirty="0">
                           <a:effectLst/>
+                          <a:latin typeface="Calibri" panose="020F0502020204030204" pitchFamily="34" charset="0"/>
+                          <a:cs typeface="Calibri" panose="020F0502020204030204" pitchFamily="34" charset="0"/>
                         </a:rPr>
                         <a:t> standardization and integration</a:t>
                       </a:r>
@@ -10652,7 +10754,8 @@
                           <a:srgbClr val="000000"/>
                         </a:solidFill>
                         <a:effectLst/>
-                        <a:latin typeface="Aptos Narrow" panose="020B0004020202020204" pitchFamily="34" charset="0"/>
+                        <a:latin typeface="Calibri" panose="020F0502020204030204" pitchFamily="34" charset="0"/>
+                        <a:cs typeface="Calibri" panose="020F0502020204030204" pitchFamily="34" charset="0"/>
                       </a:endParaRPr>
                     </a:p>
                   </a:txBody>
@@ -10667,6 +10770,8 @@
                       <a:r>
                         <a:rPr lang="en-US" sz="1600" u="none" strike="noStrike" dirty="0">
                           <a:effectLst/>
+                          <a:latin typeface="Calibri" panose="020F0502020204030204" pitchFamily="34" charset="0"/>
+                          <a:cs typeface="Calibri" panose="020F0502020204030204" pitchFamily="34" charset="0"/>
                         </a:rPr>
                         <a:t>Frameworks for PQC adoption and migration strategies</a:t>
                       </a:r>
@@ -10675,7 +10780,8 @@
                           <a:srgbClr val="000000"/>
                         </a:solidFill>
                         <a:effectLst/>
-                        <a:latin typeface="Aptos Narrow" panose="020B0004020202020204" pitchFamily="34" charset="0"/>
+                        <a:latin typeface="Calibri" panose="020F0502020204030204" pitchFamily="34" charset="0"/>
+                        <a:cs typeface="Calibri" panose="020F0502020204030204" pitchFamily="34" charset="0"/>
                       </a:endParaRPr>
                     </a:p>
                   </a:txBody>
@@ -10687,7 +10793,7 @@
                   </a:ext>
                 </a:extLst>
               </a:tr>
-              <a:tr h="1027440">
+              <a:tr h="724754">
                 <a:tc rowSpan="2">
                   <a:txBody>
                     <a:bodyPr/>
@@ -10697,6 +10803,8 @@
                       <a:r>
                         <a:rPr lang="en-US" sz="1600" b="1" u="none" strike="noStrike" dirty="0">
                           <a:effectLst/>
+                          <a:latin typeface="Calibri" panose="020F0502020204030204" pitchFamily="34" charset="0"/>
+                          <a:cs typeface="Calibri" panose="020F0502020204030204" pitchFamily="34" charset="0"/>
                         </a:rPr>
                         <a:t>China</a:t>
                       </a:r>
@@ -10705,7 +10813,8 @@
                           <a:srgbClr val="000000"/>
                         </a:solidFill>
                         <a:effectLst/>
-                        <a:latin typeface="Aptos Narrow" panose="020B0004020202020204" pitchFamily="34" charset="0"/>
+                        <a:latin typeface="Calibri" panose="020F0502020204030204" pitchFamily="34" charset="0"/>
+                        <a:cs typeface="Calibri" panose="020F0502020204030204" pitchFamily="34" charset="0"/>
                       </a:endParaRPr>
                     </a:p>
                   </a:txBody>
@@ -10720,18 +10829,24 @@
                       <a:r>
                         <a:rPr lang="en-US" sz="1600" u="none" strike="noStrike" dirty="0">
                           <a:effectLst/>
+                          <a:latin typeface="Calibri" panose="020F0502020204030204" pitchFamily="34" charset="0"/>
+                          <a:cs typeface="Calibri" panose="020F0502020204030204" pitchFamily="34" charset="0"/>
                         </a:rPr>
                         <a:t>National Cryptography Administration (</a:t>
                       </a:r>
                       <a:r>
                         <a:rPr lang="en-US" sz="1600" b="1" u="none" strike="noStrike" dirty="0">
                           <a:effectLst/>
+                          <a:latin typeface="Calibri" panose="020F0502020204030204" pitchFamily="34" charset="0"/>
+                          <a:cs typeface="Calibri" panose="020F0502020204030204" pitchFamily="34" charset="0"/>
                         </a:rPr>
                         <a:t>NCA</a:t>
                       </a:r>
                       <a:r>
                         <a:rPr lang="en-US" sz="1600" u="none" strike="noStrike" dirty="0">
                           <a:effectLst/>
+                          <a:latin typeface="Calibri" panose="020F0502020204030204" pitchFamily="34" charset="0"/>
+                          <a:cs typeface="Calibri" panose="020F0502020204030204" pitchFamily="34" charset="0"/>
                         </a:rPr>
                         <a:t>)</a:t>
                       </a:r>
@@ -10740,7 +10855,8 @@
                           <a:srgbClr val="000000"/>
                         </a:solidFill>
                         <a:effectLst/>
-                        <a:latin typeface="Aptos Narrow" panose="020B0004020202020204" pitchFamily="34" charset="0"/>
+                        <a:latin typeface="Calibri" panose="020F0502020204030204" pitchFamily="34" charset="0"/>
+                        <a:cs typeface="Calibri" panose="020F0502020204030204" pitchFamily="34" charset="0"/>
                       </a:endParaRPr>
                     </a:p>
                   </a:txBody>
@@ -10755,17 +10871,23 @@
                       <a:r>
                         <a:rPr lang="en-US" sz="1600" u="none" strike="noStrike">
                           <a:effectLst/>
+                          <a:latin typeface="Calibri" panose="020F0502020204030204" pitchFamily="34" charset="0"/>
+                          <a:cs typeface="Calibri" panose="020F0502020204030204" pitchFamily="34" charset="0"/>
                         </a:rPr>
                         <a:t>National PQC standardization </a:t>
                       </a:r>
                       <a:br>
                         <a:rPr lang="en-US" sz="1600" u="none" strike="noStrike">
                           <a:effectLst/>
+                          <a:latin typeface="Calibri" panose="020F0502020204030204" pitchFamily="34" charset="0"/>
+                          <a:cs typeface="Calibri" panose="020F0502020204030204" pitchFamily="34" charset="0"/>
                         </a:rPr>
                       </a:br>
                       <a:r>
                         <a:rPr lang="en-US" sz="1600" u="none" strike="noStrike">
                           <a:effectLst/>
+                          <a:latin typeface="Calibri" panose="020F0502020204030204" pitchFamily="34" charset="0"/>
+                          <a:cs typeface="Calibri" panose="020F0502020204030204" pitchFamily="34" charset="0"/>
                         </a:rPr>
                         <a:t>- Development of  quantum-resistant algorithms</a:t>
                       </a:r>
@@ -10774,7 +10896,8 @@
                           <a:srgbClr val="000000"/>
                         </a:solidFill>
                         <a:effectLst/>
-                        <a:latin typeface="Aptos Narrow" panose="020B0004020202020204" pitchFamily="34" charset="0"/>
+                        <a:latin typeface="Calibri" panose="020F0502020204030204" pitchFamily="34" charset="0"/>
+                        <a:cs typeface="Calibri" panose="020F0502020204030204" pitchFamily="34" charset="0"/>
                       </a:endParaRPr>
                     </a:p>
                   </a:txBody>
@@ -10789,12 +10912,16 @@
                       <a:r>
                         <a:rPr lang="en-US" sz="1600" b="1" u="none" strike="noStrike" dirty="0">
                           <a:effectLst/>
+                          <a:latin typeface="Calibri" panose="020F0502020204030204" pitchFamily="34" charset="0"/>
+                          <a:cs typeface="Calibri" panose="020F0502020204030204" pitchFamily="34" charset="0"/>
                         </a:rPr>
                         <a:t>Proprietary</a:t>
                       </a:r>
                       <a:r>
                         <a:rPr lang="en-US" sz="1600" u="none" strike="noStrike" dirty="0">
                           <a:effectLst/>
+                          <a:latin typeface="Calibri" panose="020F0502020204030204" pitchFamily="34" charset="0"/>
+                          <a:cs typeface="Calibri" panose="020F0502020204030204" pitchFamily="34" charset="0"/>
                         </a:rPr>
                         <a:t> algorithms under evaluation </a:t>
                       </a:r>
@@ -10804,6 +10931,8 @@
                       <a:r>
                         <a:rPr lang="en-US" sz="1600" b="1" u="none" strike="noStrike" dirty="0">
                           <a:effectLst/>
+                          <a:latin typeface="Calibri" panose="020F0502020204030204" pitchFamily="34" charset="0"/>
+                          <a:cs typeface="Calibri" panose="020F0502020204030204" pitchFamily="34" charset="0"/>
                         </a:rPr>
                         <a:t>(not publicly disclosed)</a:t>
                       </a:r>
@@ -10812,7 +10941,8 @@
                           <a:srgbClr val="000000"/>
                         </a:solidFill>
                         <a:effectLst/>
-                        <a:latin typeface="Aptos Narrow" panose="020B0004020202020204" pitchFamily="34" charset="0"/>
+                        <a:latin typeface="Calibri" panose="020F0502020204030204" pitchFamily="34" charset="0"/>
+                        <a:cs typeface="Calibri" panose="020F0502020204030204" pitchFamily="34" charset="0"/>
                       </a:endParaRPr>
                     </a:p>
                   </a:txBody>
@@ -10824,7 +10954,7 @@
                   </a:ext>
                 </a:extLst>
               </a:tr>
-              <a:tr h="1074861">
+              <a:tr h="594494">
                 <a:tc vMerge="1">
                   <a:txBody>
                     <a:bodyPr/>
@@ -10844,18 +10974,24 @@
                       <a:r>
                         <a:rPr lang="en-US" sz="1600" u="none" strike="noStrike" dirty="0">
                           <a:effectLst/>
+                          <a:latin typeface="Calibri" panose="020F0502020204030204" pitchFamily="34" charset="0"/>
+                          <a:cs typeface="Calibri" panose="020F0502020204030204" pitchFamily="34" charset="0"/>
                         </a:rPr>
                         <a:t>Institute of Commercial Cryptography Standards (</a:t>
                       </a:r>
                       <a:r>
                         <a:rPr lang="en-US" sz="1600" b="1" u="none" strike="noStrike" dirty="0">
                           <a:effectLst/>
+                          <a:latin typeface="Calibri" panose="020F0502020204030204" pitchFamily="34" charset="0"/>
+                          <a:cs typeface="Calibri" panose="020F0502020204030204" pitchFamily="34" charset="0"/>
                         </a:rPr>
                         <a:t>ICCS</a:t>
                       </a:r>
                       <a:r>
                         <a:rPr lang="en-US" sz="1600" u="none" strike="noStrike" dirty="0">
                           <a:effectLst/>
+                          <a:latin typeface="Calibri" panose="020F0502020204030204" pitchFamily="34" charset="0"/>
+                          <a:cs typeface="Calibri" panose="020F0502020204030204" pitchFamily="34" charset="0"/>
                         </a:rPr>
                         <a:t>)</a:t>
                       </a:r>
@@ -10864,7 +11000,8 @@
                           <a:srgbClr val="000000"/>
                         </a:solidFill>
                         <a:effectLst/>
-                        <a:latin typeface="Aptos Narrow" panose="020B0004020202020204" pitchFamily="34" charset="0"/>
+                        <a:latin typeface="Calibri" panose="020F0502020204030204" pitchFamily="34" charset="0"/>
+                        <a:cs typeface="Calibri" panose="020F0502020204030204" pitchFamily="34" charset="0"/>
                       </a:endParaRPr>
                     </a:p>
                   </a:txBody>
@@ -10879,6 +11016,8 @@
                       <a:r>
                         <a:rPr lang="en-US" sz="1600" u="none" strike="noStrike">
                           <a:effectLst/>
+                          <a:latin typeface="Calibri" panose="020F0502020204030204" pitchFamily="34" charset="0"/>
+                          <a:cs typeface="Calibri" panose="020F0502020204030204" pitchFamily="34" charset="0"/>
                         </a:rPr>
                         <a:t>PQC Evaluation based on security, performance, and feasibility</a:t>
                       </a:r>
@@ -10887,7 +11026,8 @@
                           <a:srgbClr val="000000"/>
                         </a:solidFill>
                         <a:effectLst/>
-                        <a:latin typeface="Aptos Narrow" panose="020B0004020202020204" pitchFamily="34" charset="0"/>
+                        <a:latin typeface="Calibri" panose="020F0502020204030204" pitchFamily="34" charset="0"/>
+                        <a:cs typeface="Calibri" panose="020F0502020204030204" pitchFamily="34" charset="0"/>
                       </a:endParaRPr>
                     </a:p>
                   </a:txBody>
@@ -10902,6 +11042,8 @@
                       <a:r>
                         <a:rPr lang="en-US" sz="1600" u="none" strike="noStrike" dirty="0">
                           <a:effectLst/>
+                          <a:latin typeface="Calibri" panose="020F0502020204030204" pitchFamily="34" charset="0"/>
+                          <a:cs typeface="Calibri" panose="020F0502020204030204" pitchFamily="34" charset="0"/>
                         </a:rPr>
                         <a:t>Ongoing selection process for suitable algorithms</a:t>
                       </a:r>
@@ -10910,7 +11052,8 @@
                           <a:srgbClr val="000000"/>
                         </a:solidFill>
                         <a:effectLst/>
-                        <a:latin typeface="Aptos Narrow" panose="020B0004020202020204" pitchFamily="34" charset="0"/>
+                        <a:latin typeface="Calibri" panose="020F0502020204030204" pitchFamily="34" charset="0"/>
+                        <a:cs typeface="Calibri" panose="020F0502020204030204" pitchFamily="34" charset="0"/>
                       </a:endParaRPr>
                     </a:p>
                   </a:txBody>
@@ -10922,50 +11065,515 @@
                   </a:ext>
                 </a:extLst>
               </a:tr>
+              <a:tr h="1074861">
+                <a:tc>
+                  <a:txBody>
+                    <a:bodyPr/>
+                    <a:lstStyle/>
+                    <a:p>
+                      <a:pPr algn="ctr" fontAlgn="ctr"/>
+                      <a:r>
+                        <a:rPr lang="en-US" sz="1600" b="1" i="0" u="none" strike="noStrike" dirty="0">
+                          <a:solidFill>
+                            <a:srgbClr val="000000"/>
+                          </a:solidFill>
+                          <a:effectLst/>
+                          <a:latin typeface="Calibri" panose="020F0502020204030204" pitchFamily="34" charset="0"/>
+                          <a:cs typeface="Calibri" panose="020F0502020204030204" pitchFamily="34" charset="0"/>
+                        </a:rPr>
+                        <a:t>Middle East</a:t>
+                      </a:r>
+                    </a:p>
+                  </a:txBody>
+                  <a:tcPr marL="8340" marR="8340" marT="8340" marB="0" anchor="ctr"/>
+                </a:tc>
+                <a:tc>
+                  <a:txBody>
+                    <a:bodyPr/>
+                    <a:lstStyle/>
+                    <a:p>
+                      <a:pPr algn="l" fontAlgn="ctr"/>
+                      <a:r>
+                        <a:rPr lang="en-US" sz="1600" b="1" i="0" u="none" strike="noStrike" dirty="0">
+                          <a:solidFill>
+                            <a:srgbClr val="000000"/>
+                          </a:solidFill>
+                          <a:effectLst/>
+                          <a:latin typeface="Calibri" panose="020F0502020204030204" pitchFamily="34" charset="0"/>
+                          <a:cs typeface="Calibri" panose="020F0502020204030204" pitchFamily="34" charset="0"/>
+                        </a:rPr>
+                        <a:t>- KSA: NCA (National Cybersecurity Authority) - NCS-2:2025</a:t>
+                      </a:r>
+                    </a:p>
+                    <a:p>
+                      <a:pPr algn="l" fontAlgn="ctr"/>
+                      <a:endParaRPr lang="en-US" sz="1600" b="1" i="0" u="none" strike="noStrike" dirty="0">
+                        <a:solidFill>
+                          <a:srgbClr val="000000"/>
+                        </a:solidFill>
+                        <a:effectLst/>
+                        <a:latin typeface="Calibri" panose="020F0502020204030204" pitchFamily="34" charset="0"/>
+                        <a:cs typeface="Calibri" panose="020F0502020204030204" pitchFamily="34" charset="0"/>
+                      </a:endParaRPr>
+                    </a:p>
+                    <a:p>
+                      <a:pPr algn="l" fontAlgn="ctr"/>
+                      <a:endParaRPr lang="en-US" sz="1600" b="1" i="0" u="none" strike="noStrike" dirty="0">
+                        <a:solidFill>
+                          <a:srgbClr val="000000"/>
+                        </a:solidFill>
+                        <a:effectLst/>
+                        <a:latin typeface="Calibri" panose="020F0502020204030204" pitchFamily="34" charset="0"/>
+                        <a:cs typeface="Calibri" panose="020F0502020204030204" pitchFamily="34" charset="0"/>
+                      </a:endParaRPr>
+                    </a:p>
+                    <a:p>
+                      <a:pPr algn="l" fontAlgn="ctr"/>
+                      <a:r>
+                        <a:rPr lang="en-US" sz="1600" b="1" dirty="0">
+                          <a:latin typeface="Calibri" panose="020F0502020204030204" pitchFamily="34" charset="0"/>
+                          <a:cs typeface="Calibri" panose="020F0502020204030204" pitchFamily="34" charset="0"/>
+                        </a:rPr>
+                        <a:t>- UAE:</a:t>
+                      </a:r>
+                      <a:r>
+                        <a:rPr lang="en-US" sz="1600" dirty="0">
+                          <a:latin typeface="Calibri" panose="020F0502020204030204" pitchFamily="34" charset="0"/>
+                          <a:cs typeface="Calibri" panose="020F0502020204030204" pitchFamily="34" charset="0"/>
+                        </a:rPr>
+                        <a:t> </a:t>
+                      </a:r>
+                      <a:r>
+                        <a:rPr lang="en-US" sz="1600" b="1" dirty="0">
+                          <a:latin typeface="Calibri" panose="020F0502020204030204" pitchFamily="34" charset="0"/>
+                          <a:cs typeface="Calibri" panose="020F0502020204030204" pitchFamily="34" charset="0"/>
+                        </a:rPr>
+                        <a:t>UAECSC</a:t>
+                      </a:r>
+                      <a:r>
+                        <a:rPr lang="en-US" sz="1600" dirty="0">
+                          <a:latin typeface="Calibri" panose="020F0502020204030204" pitchFamily="34" charset="0"/>
+                          <a:cs typeface="Calibri" panose="020F0502020204030204" pitchFamily="34" charset="0"/>
+                        </a:rPr>
+                        <a:t> (Cyber Security Council) </a:t>
+                      </a:r>
+                      <a:r>
+                        <a:rPr lang="en-US" sz="1600" b="1" dirty="0">
+                          <a:latin typeface="Calibri" panose="020F0502020204030204" pitchFamily="34" charset="0"/>
+                          <a:cs typeface="Calibri" panose="020F0502020204030204" pitchFamily="34" charset="0"/>
+                        </a:rPr>
+                        <a:t>National Encryption Policy</a:t>
+                      </a:r>
+                    </a:p>
+                    <a:p>
+                      <a:pPr algn="l" fontAlgn="ctr"/>
+                      <a:endParaRPr lang="en-US" sz="1600" b="1" i="0" u="none" strike="noStrike" dirty="0">
+                        <a:solidFill>
+                          <a:srgbClr val="000000"/>
+                        </a:solidFill>
+                        <a:effectLst/>
+                        <a:latin typeface="Calibri" panose="020F0502020204030204" pitchFamily="34" charset="0"/>
+                        <a:cs typeface="Calibri" panose="020F0502020204030204" pitchFamily="34" charset="0"/>
+                      </a:endParaRPr>
+                    </a:p>
+                    <a:p>
+                      <a:pPr algn="l" fontAlgn="ctr"/>
+                      <a:endParaRPr lang="en-US" sz="1600" b="1" i="0" u="none" strike="noStrike" dirty="0">
+                        <a:solidFill>
+                          <a:srgbClr val="000000"/>
+                        </a:solidFill>
+                        <a:effectLst/>
+                        <a:latin typeface="Calibri" panose="020F0502020204030204" pitchFamily="34" charset="0"/>
+                        <a:cs typeface="Calibri" panose="020F0502020204030204" pitchFamily="34" charset="0"/>
+                      </a:endParaRPr>
+                    </a:p>
+                    <a:p>
+                      <a:pPr algn="l" fontAlgn="ctr"/>
+                      <a:r>
+                        <a:rPr lang="en-US" sz="1600" b="1" dirty="0">
+                          <a:latin typeface="Calibri" panose="020F0502020204030204" pitchFamily="34" charset="0"/>
+                          <a:cs typeface="Calibri" panose="020F0502020204030204" pitchFamily="34" charset="0"/>
+                        </a:rPr>
+                        <a:t>- Qatar: NCSA</a:t>
+                      </a:r>
+                      <a:r>
+                        <a:rPr lang="en-US" sz="1600" dirty="0">
+                          <a:latin typeface="Calibri" panose="020F0502020204030204" pitchFamily="34" charset="0"/>
+                          <a:cs typeface="Calibri" panose="020F0502020204030204" pitchFamily="34" charset="0"/>
+                        </a:rPr>
+                        <a:t> (National Cybersecurity Agency) - </a:t>
+                      </a:r>
+                      <a:r>
+                        <a:rPr lang="en-US" sz="1600" b="1" dirty="0">
+                          <a:latin typeface="Calibri" panose="020F0502020204030204" pitchFamily="34" charset="0"/>
+                          <a:cs typeface="Calibri" panose="020F0502020204030204" pitchFamily="34" charset="0"/>
+                        </a:rPr>
+                        <a:t>Strategy 2024–2030</a:t>
+                      </a:r>
+                    </a:p>
+                    <a:p>
+                      <a:pPr algn="l" fontAlgn="ctr"/>
+                      <a:endParaRPr lang="en-US" sz="1600" b="1" i="0" u="none" strike="noStrike" dirty="0">
+                        <a:solidFill>
+                          <a:srgbClr val="000000"/>
+                        </a:solidFill>
+                        <a:effectLst/>
+                        <a:latin typeface="Calibri" panose="020F0502020204030204" pitchFamily="34" charset="0"/>
+                        <a:cs typeface="Calibri" panose="020F0502020204030204" pitchFamily="34" charset="0"/>
+                      </a:endParaRPr>
+                    </a:p>
+                  </a:txBody>
+                  <a:tcPr marL="8340" marR="8340" marT="8340" marB="0" anchor="ctr"/>
+                </a:tc>
+                <a:tc>
+                  <a:txBody>
+                    <a:bodyPr/>
+                    <a:lstStyle/>
+                    <a:p>
+                      <a:pPr algn="l" fontAlgn="ctr"/>
+                      <a:r>
+                        <a:rPr lang="en-US" sz="1600" b="1" i="0" u="none" strike="noStrike" dirty="0">
+                          <a:solidFill>
+                            <a:srgbClr val="000000"/>
+                          </a:solidFill>
+                          <a:effectLst/>
+                          <a:latin typeface="Calibri" panose="020F0502020204030204" pitchFamily="34" charset="0"/>
+                          <a:cs typeface="Calibri" panose="020F0502020204030204" pitchFamily="34" charset="0"/>
+                        </a:rPr>
+                        <a:t>- KSA</a:t>
+                      </a:r>
+                      <a:r>
+                        <a:rPr lang="en-US" sz="1600" b="0" i="0" u="none" strike="noStrike" dirty="0">
+                          <a:solidFill>
+                            <a:srgbClr val="000000"/>
+                          </a:solidFill>
+                          <a:effectLst/>
+                          <a:latin typeface="Calibri" panose="020F0502020204030204" pitchFamily="34" charset="0"/>
+                          <a:cs typeface="Calibri" panose="020F0502020204030204" pitchFamily="34" charset="0"/>
+                        </a:rPr>
+                        <a:t>: </a:t>
+                      </a:r>
+                      <a:r>
+                        <a:rPr lang="en-US" sz="1600" b="1" i="0" u="none" strike="noStrike" dirty="0">
+                          <a:solidFill>
+                            <a:srgbClr val="000000"/>
+                          </a:solidFill>
+                          <a:effectLst/>
+                          <a:latin typeface="Calibri" panose="020F0502020204030204" pitchFamily="34" charset="0"/>
+                          <a:cs typeface="Calibri" panose="020F0502020204030204" pitchFamily="34" charset="0"/>
+                        </a:rPr>
+                        <a:t>Dec 2025 – </a:t>
+                      </a:r>
+                      <a:r>
+                        <a:rPr lang="en-US" sz="1600" b="1" i="0" u="none" strike="noStrike" dirty="0" err="1">
+                          <a:solidFill>
+                            <a:srgbClr val="000000"/>
+                          </a:solidFill>
+                          <a:effectLst/>
+                          <a:latin typeface="Calibri" panose="020F0502020204030204" pitchFamily="34" charset="0"/>
+                          <a:cs typeface="Calibri" panose="020F0502020204030204" pitchFamily="34" charset="0"/>
+                        </a:rPr>
+                        <a:t>Q2</a:t>
+                      </a:r>
+                      <a:r>
+                        <a:rPr lang="en-US" sz="1600" b="1" i="0" u="none" strike="noStrike" dirty="0">
+                          <a:solidFill>
+                            <a:srgbClr val="000000"/>
+                          </a:solidFill>
+                          <a:effectLst/>
+                          <a:latin typeface="Calibri" panose="020F0502020204030204" pitchFamily="34" charset="0"/>
+                          <a:cs typeface="Calibri" panose="020F0502020204030204" pitchFamily="34" charset="0"/>
+                        </a:rPr>
+                        <a:t> 2026</a:t>
+                      </a:r>
+                      <a:r>
+                        <a:rPr lang="en-US" sz="1600" b="0" i="0" u="none" strike="noStrike" dirty="0">
+                          <a:solidFill>
+                            <a:srgbClr val="000000"/>
+                          </a:solidFill>
+                          <a:effectLst/>
+                          <a:latin typeface="Calibri" panose="020F0502020204030204" pitchFamily="34" charset="0"/>
+                          <a:cs typeface="Calibri" panose="020F0502020204030204" pitchFamily="34" charset="0"/>
+                        </a:rPr>
+                        <a:t>: Mandatory submission of PQC Risk Assessments and "Advanced" level crypto-inventories for CNI</a:t>
+                      </a:r>
+                    </a:p>
+                    <a:p>
+                      <a:pPr algn="l" fontAlgn="ctr"/>
+                      <a:endParaRPr lang="en-US" sz="1600" b="0" i="0" u="none" strike="noStrike" dirty="0">
+                        <a:solidFill>
+                          <a:srgbClr val="000000"/>
+                        </a:solidFill>
+                        <a:effectLst/>
+                        <a:latin typeface="Calibri" panose="020F0502020204030204" pitchFamily="34" charset="0"/>
+                        <a:cs typeface="Calibri" panose="020F0502020204030204" pitchFamily="34" charset="0"/>
+                      </a:endParaRPr>
+                    </a:p>
+                    <a:p>
+                      <a:pPr algn="l" fontAlgn="ctr"/>
+                      <a:r>
+                        <a:rPr lang="en-US" sz="1600" b="1" i="0" u="none" strike="noStrike" dirty="0">
+                          <a:solidFill>
+                            <a:srgbClr val="000000"/>
+                          </a:solidFill>
+                          <a:effectLst/>
+                          <a:latin typeface="Calibri" panose="020F0502020204030204" pitchFamily="34" charset="0"/>
+                          <a:cs typeface="Calibri" panose="020F0502020204030204" pitchFamily="34" charset="0"/>
+                        </a:rPr>
+                        <a:t>- UAE</a:t>
+                      </a:r>
+                      <a:r>
+                        <a:rPr lang="en-US" sz="1600" b="0" i="0" u="none" strike="noStrike" dirty="0">
+                          <a:solidFill>
+                            <a:srgbClr val="000000"/>
+                          </a:solidFill>
+                          <a:effectLst/>
+                          <a:latin typeface="Calibri" panose="020F0502020204030204" pitchFamily="34" charset="0"/>
+                          <a:cs typeface="Calibri" panose="020F0502020204030204" pitchFamily="34" charset="0"/>
+                        </a:rPr>
+                        <a:t>: </a:t>
+                      </a:r>
+                      <a:r>
+                        <a:rPr lang="en-US" sz="1600" b="1" i="0" u="none" strike="noStrike" dirty="0">
+                          <a:solidFill>
+                            <a:srgbClr val="000000"/>
+                          </a:solidFill>
+                          <a:effectLst/>
+                          <a:latin typeface="Calibri" panose="020F0502020204030204" pitchFamily="34" charset="0"/>
+                          <a:cs typeface="Calibri" panose="020F0502020204030204" pitchFamily="34" charset="0"/>
+                        </a:rPr>
+                        <a:t>May – July 2026</a:t>
+                      </a:r>
+                      <a:r>
+                        <a:rPr lang="en-US" sz="1600" b="0" i="0" u="none" strike="noStrike" dirty="0">
+                          <a:solidFill>
+                            <a:srgbClr val="000000"/>
+                          </a:solidFill>
+                          <a:effectLst/>
+                          <a:latin typeface="Calibri" panose="020F0502020204030204" pitchFamily="34" charset="0"/>
+                          <a:cs typeface="Calibri" panose="020F0502020204030204" pitchFamily="34" charset="0"/>
+                        </a:rPr>
+                        <a:t>: Entities must submit PQC Migration Plans within 180 days of regulatory "Phase 0" notification.</a:t>
+                      </a:r>
+                    </a:p>
+                    <a:p>
+                      <a:pPr algn="l" fontAlgn="ctr"/>
+                      <a:endParaRPr lang="en-US" sz="1600" b="0" i="0" u="none" strike="noStrike" dirty="0">
+                        <a:solidFill>
+                          <a:srgbClr val="000000"/>
+                        </a:solidFill>
+                        <a:effectLst/>
+                        <a:latin typeface="Calibri" panose="020F0502020204030204" pitchFamily="34" charset="0"/>
+                        <a:cs typeface="Calibri" panose="020F0502020204030204" pitchFamily="34" charset="0"/>
+                      </a:endParaRPr>
+                    </a:p>
+                    <a:p>
+                      <a:pPr algn="l" fontAlgn="ctr"/>
+                      <a:r>
+                        <a:rPr lang="en-US" sz="1600" b="1" i="0" u="none" strike="noStrike" dirty="0">
+                          <a:solidFill>
+                            <a:srgbClr val="000000"/>
+                          </a:solidFill>
+                          <a:effectLst/>
+                          <a:latin typeface="Calibri" panose="020F0502020204030204" pitchFamily="34" charset="0"/>
+                          <a:cs typeface="Calibri" panose="020F0502020204030204" pitchFamily="34" charset="0"/>
+                        </a:rPr>
+                        <a:t>- Qatar</a:t>
+                      </a:r>
+                      <a:r>
+                        <a:rPr lang="en-US" sz="1600" b="0" i="0" u="none" strike="noStrike" dirty="0">
+                          <a:solidFill>
+                            <a:srgbClr val="000000"/>
+                          </a:solidFill>
+                          <a:effectLst/>
+                          <a:latin typeface="Calibri" panose="020F0502020204030204" pitchFamily="34" charset="0"/>
+                          <a:cs typeface="Calibri" panose="020F0502020204030204" pitchFamily="34" charset="0"/>
+                        </a:rPr>
+                        <a:t>: </a:t>
+                      </a:r>
+                      <a:r>
+                        <a:rPr lang="en-US" sz="1600" b="1" i="0" u="none" strike="noStrike" dirty="0">
+                          <a:solidFill>
+                            <a:srgbClr val="000000"/>
+                          </a:solidFill>
+                          <a:effectLst/>
+                          <a:latin typeface="Calibri" panose="020F0502020204030204" pitchFamily="34" charset="0"/>
+                          <a:cs typeface="Calibri" panose="020F0502020204030204" pitchFamily="34" charset="0"/>
+                        </a:rPr>
+                        <a:t>end of 2026</a:t>
+                      </a:r>
+                      <a:r>
+                        <a:rPr lang="en-US" sz="1600" b="0" i="0" u="none" strike="noStrike" dirty="0">
+                          <a:solidFill>
+                            <a:srgbClr val="000000"/>
+                          </a:solidFill>
+                          <a:effectLst/>
+                          <a:latin typeface="Calibri" panose="020F0502020204030204" pitchFamily="34" charset="0"/>
+                          <a:cs typeface="Calibri" panose="020F0502020204030204" pitchFamily="34" charset="0"/>
+                        </a:rPr>
+                        <a:t>: Modernization of financial sector PKI to support hybrid PQC/classical algorithms.</a:t>
+                      </a:r>
+                    </a:p>
+                  </a:txBody>
+                  <a:tcPr marL="8340" marR="8340" marT="8340" marB="0" anchor="ctr"/>
+                </a:tc>
+                <a:tc>
+                  <a:txBody>
+                    <a:bodyPr/>
+                    <a:lstStyle/>
+                    <a:p>
+                      <a:pPr algn="l" fontAlgn="ctr"/>
+                      <a:r>
+                        <a:rPr lang="en-US" sz="1600" b="0" i="0" u="none" strike="noStrike" dirty="0">
+                          <a:solidFill>
+                            <a:srgbClr val="000000"/>
+                          </a:solidFill>
+                          <a:effectLst/>
+                          <a:latin typeface="Calibri" panose="020F0502020204030204" pitchFamily="34" charset="0"/>
+                          <a:cs typeface="Calibri" panose="020F0502020204030204" pitchFamily="34" charset="0"/>
+                        </a:rPr>
+                        <a:t>NIST Baseline: ML-KEM (Kyber), ML-DSA (</a:t>
+                      </a:r>
+                      <a:r>
+                        <a:rPr lang="en-US" sz="1600" b="0" i="0" u="none" strike="noStrike" dirty="0" err="1">
+                          <a:solidFill>
+                            <a:srgbClr val="000000"/>
+                          </a:solidFill>
+                          <a:effectLst/>
+                          <a:latin typeface="Calibri" panose="020F0502020204030204" pitchFamily="34" charset="0"/>
+                          <a:cs typeface="Calibri" panose="020F0502020204030204" pitchFamily="34" charset="0"/>
+                        </a:rPr>
+                        <a:t>Dilithium</a:t>
+                      </a:r>
+                      <a:r>
+                        <a:rPr lang="en-US" sz="1600" b="0" i="0" u="none" strike="noStrike" dirty="0">
+                          <a:solidFill>
+                            <a:srgbClr val="000000"/>
+                          </a:solidFill>
+                          <a:effectLst/>
+                          <a:latin typeface="Calibri" panose="020F0502020204030204" pitchFamily="34" charset="0"/>
+                          <a:cs typeface="Calibri" panose="020F0502020204030204" pitchFamily="34" charset="0"/>
+                        </a:rPr>
+                        <a:t>).</a:t>
+                      </a:r>
+                    </a:p>
+                    <a:p>
+                      <a:pPr algn="l" fontAlgn="ctr"/>
+                      <a:r>
+                        <a:rPr lang="en-US" sz="1600" b="0" i="0" u="none" strike="noStrike" dirty="0">
+                          <a:solidFill>
+                            <a:srgbClr val="000000"/>
+                          </a:solidFill>
+                          <a:effectLst/>
+                          <a:latin typeface="Calibri" panose="020F0502020204030204" pitchFamily="34" charset="0"/>
+                          <a:cs typeface="Calibri" panose="020F0502020204030204" pitchFamily="34" charset="0"/>
+                        </a:rPr>
+                        <a:t>NCS-2 Requirement: "Advanced" level systems must support Crypto-Agility and hybrid key exchange (e.g., </a:t>
+                      </a:r>
+                      <a:r>
+                        <a:rPr lang="en-US" sz="1600" b="0" i="0" u="none" strike="noStrike" dirty="0" err="1">
+                          <a:solidFill>
+                            <a:srgbClr val="000000"/>
+                          </a:solidFill>
+                          <a:effectLst/>
+                          <a:latin typeface="Calibri" panose="020F0502020204030204" pitchFamily="34" charset="0"/>
+                          <a:cs typeface="Calibri" panose="020F0502020204030204" pitchFamily="34" charset="0"/>
+                        </a:rPr>
+                        <a:t>X25519</a:t>
+                      </a:r>
+                      <a:r>
+                        <a:rPr lang="en-US" sz="1600" b="0" i="0" u="none" strike="noStrike" dirty="0">
+                          <a:solidFill>
+                            <a:srgbClr val="000000"/>
+                          </a:solidFill>
+                          <a:effectLst/>
+                          <a:latin typeface="Calibri" panose="020F0502020204030204" pitchFamily="34" charset="0"/>
+                          <a:cs typeface="Calibri" panose="020F0502020204030204" pitchFamily="34" charset="0"/>
+                        </a:rPr>
+                        <a:t> + ML-KEM).</a:t>
+                      </a:r>
+                    </a:p>
+                    <a:p>
+                      <a:pPr algn="l" fontAlgn="ctr"/>
+                      <a:endParaRPr lang="en-US" sz="1600" b="0" i="0" u="none" strike="noStrike" dirty="0">
+                        <a:solidFill>
+                          <a:srgbClr val="000000"/>
+                        </a:solidFill>
+                        <a:effectLst/>
+                        <a:latin typeface="Calibri" panose="020F0502020204030204" pitchFamily="34" charset="0"/>
+                        <a:cs typeface="Calibri" panose="020F0502020204030204" pitchFamily="34" charset="0"/>
+                      </a:endParaRPr>
+                    </a:p>
+                    <a:p>
+                      <a:pPr algn="l" fontAlgn="ctr"/>
+                      <a:r>
+                        <a:rPr lang="en-US" sz="1600" b="0" i="0" u="none" strike="noStrike" dirty="0">
+                          <a:solidFill>
+                            <a:srgbClr val="000000"/>
+                          </a:solidFill>
+                          <a:effectLst/>
+                          <a:latin typeface="Calibri" panose="020F0502020204030204" pitchFamily="34" charset="0"/>
+                          <a:cs typeface="Calibri" panose="020F0502020204030204" pitchFamily="34" charset="0"/>
+                        </a:rPr>
+                        <a:t>Sovereign PQC: TII-optimized versions of ML-KEM/ML-DSA.</a:t>
+                      </a:r>
+                    </a:p>
+                    <a:p>
+                      <a:pPr algn="l" fontAlgn="ctr"/>
+                      <a:r>
+                        <a:rPr lang="en-US" sz="1600" b="0" i="0" u="none" strike="noStrike" dirty="0">
+                          <a:solidFill>
+                            <a:srgbClr val="000000"/>
+                          </a:solidFill>
+                          <a:effectLst/>
+                          <a:latin typeface="Calibri" panose="020F0502020204030204" pitchFamily="34" charset="0"/>
+                          <a:cs typeface="Calibri" panose="020F0502020204030204" pitchFamily="34" charset="0"/>
+                        </a:rPr>
+                        <a:t>Spec: Mandatory use of UAE-accredited libraries for "Priority Entities" to ensure digital sovereignty.</a:t>
+                      </a:r>
+                    </a:p>
+                    <a:p>
+                      <a:pPr algn="l" fontAlgn="ctr"/>
+                      <a:endParaRPr lang="en-US" sz="1600" b="0" i="0" u="none" strike="noStrike" dirty="0">
+                        <a:solidFill>
+                          <a:srgbClr val="000000"/>
+                        </a:solidFill>
+                        <a:effectLst/>
+                        <a:latin typeface="Calibri" panose="020F0502020204030204" pitchFamily="34" charset="0"/>
+                        <a:cs typeface="Calibri" panose="020F0502020204030204" pitchFamily="34" charset="0"/>
+                      </a:endParaRPr>
+                    </a:p>
+                    <a:p>
+                      <a:pPr algn="l" fontAlgn="ctr"/>
+                      <a:r>
+                        <a:rPr lang="en-US" sz="1600" b="0" i="0" u="none" strike="noStrike" dirty="0">
+                          <a:solidFill>
+                            <a:srgbClr val="000000"/>
+                          </a:solidFill>
+                          <a:effectLst/>
+                          <a:latin typeface="Calibri" panose="020F0502020204030204" pitchFamily="34" charset="0"/>
+                          <a:cs typeface="Calibri" panose="020F0502020204030204" pitchFamily="34" charset="0"/>
+                        </a:rPr>
+                        <a:t>Hybrid Resilience: Emphasis on dual-signature schemes and QKD (Quantum Key Distribution) for critical fiber backbones in the financial sector.</a:t>
+                      </a:r>
+                    </a:p>
+                  </a:txBody>
+                  <a:tcPr marL="8340" marR="8340" marT="8340" marB="0" anchor="ctr"/>
+                </a:tc>
+                <a:extLst>
+                  <a:ext uri="{0D108BD9-81ED-4DB2-BD59-A6C34878D82A}">
+                    <a16:rowId xmlns:a16="http://schemas.microsoft.com/office/drawing/2014/main" val="4274379056"/>
+                  </a:ext>
+                </a:extLst>
+              </a:tr>
             </a:tbl>
           </a:graphicData>
         </a:graphic>
       </p:graphicFrame>
-      <p:pic>
-        <p:nvPicPr>
-          <p:cNvPr id="2" name="Picture 1">
-            <a:extLst>
-              <a:ext uri="{FF2B5EF4-FFF2-40B4-BE49-F238E27FC236}">
-                <a16:creationId xmlns:a16="http://schemas.microsoft.com/office/drawing/2014/main" id="{4FC1F73B-EA79-F309-7B98-02A4BBF1046B}"/>
-              </a:ext>
-            </a:extLst>
-          </p:cNvPr>
-          <p:cNvPicPr>
-            <a:picLocks noChangeAspect="1"/>
-          </p:cNvPicPr>
-          <p:nvPr/>
-        </p:nvPicPr>
-        <p:blipFill>
-          <a:blip r:embed="rId2" cstate="email">
-            <a:extLst>
-              <a:ext uri="{28A0092B-C50C-407E-A947-70E740481C1C}">
-                <a14:useLocalDpi xmlns:a14="http://schemas.microsoft.com/office/drawing/2010/main"/>
-              </a:ext>
-            </a:extLst>
-          </a:blip>
-          <a:stretch>
-            <a:fillRect/>
-          </a:stretch>
-        </p:blipFill>
-        <p:spPr>
-          <a:xfrm>
-            <a:off x="12877800" y="720778"/>
-            <a:ext cx="1740108" cy="1243617"/>
-          </a:xfrm>
-          <a:prstGeom prst="rect">
-            <a:avLst/>
-          </a:prstGeom>
-        </p:spPr>
-      </p:pic>
     </p:spTree>
     <p:extLst>
       <p:ext uri="{BB962C8B-B14F-4D97-AF65-F5344CB8AC3E}">
-        <p14:creationId xmlns:p14="http://schemas.microsoft.com/office/powerpoint/2010/main" val="1458348666"/>
+        <p14:creationId xmlns:p14="http://schemas.microsoft.com/office/powerpoint/2010/main" val="3615137943"/>
       </p:ext>
     </p:extLst>
   </p:cSld>

</xml_diff>

<commit_message>
Update presentation file and remove temporary file
</commit_message>
<xml_diff>
--- a/Presentations/5.Quantum Risk Assesment.pptx
+++ b/Presentations/5.Quantum Risk Assesment.pptx
@@ -6,10 +6,10 @@
     <p:sldMasterId id="2147483670" r:id="rId2"/>
   </p:sldMasterIdLst>
   <p:notesMasterIdLst>
-    <p:notesMasterId r:id="rId18"/>
+    <p:notesMasterId r:id="rId19"/>
   </p:notesMasterIdLst>
   <p:handoutMasterIdLst>
-    <p:handoutMasterId r:id="rId19"/>
+    <p:handoutMasterId r:id="rId20"/>
   </p:handoutMasterIdLst>
   <p:sldIdLst>
     <p:sldId id="141168164" r:id="rId3"/>
@@ -25,8 +25,9 @@
     <p:sldId id="141168171" r:id="rId13"/>
     <p:sldId id="141168178" r:id="rId14"/>
     <p:sldId id="141168172" r:id="rId15"/>
-    <p:sldId id="141168168" r:id="rId16"/>
-    <p:sldId id="141168169" r:id="rId17"/>
+    <p:sldId id="141168185" r:id="rId16"/>
+    <p:sldId id="141168168" r:id="rId17"/>
+    <p:sldId id="141168169" r:id="rId18"/>
   </p:sldIdLst>
   <p:sldSz cx="14630400" cy="8229600"/>
   <p:notesSz cx="6858000" cy="9144000"/>
@@ -5383,6 +5384,280 @@
         <p:cNvPr id="1" name="">
           <a:extLst>
             <a:ext uri="{FF2B5EF4-FFF2-40B4-BE49-F238E27FC236}">
+              <a16:creationId xmlns:a16="http://schemas.microsoft.com/office/drawing/2014/main" id="{DDE2D47F-9694-36DE-5001-1371A174C4EE}"/>
+            </a:ext>
+          </a:extLst>
+        </p:cNvPr>
+        <p:cNvGrpSpPr/>
+        <p:nvPr/>
+      </p:nvGrpSpPr>
+      <p:grpSpPr>
+        <a:xfrm>
+          <a:off x="0" y="0"/>
+          <a:ext cx="0" cy="0"/>
+          <a:chOff x="0" y="0"/>
+          <a:chExt cx="0" cy="0"/>
+        </a:xfrm>
+      </p:grpSpPr>
+      <p:sp>
+        <p:nvSpPr>
+          <p:cNvPr id="2" name="Title 1">
+            <a:extLst>
+              <a:ext uri="{FF2B5EF4-FFF2-40B4-BE49-F238E27FC236}">
+                <a16:creationId xmlns:a16="http://schemas.microsoft.com/office/drawing/2014/main" id="{10957A53-5D30-BDD1-A834-34ECAFE0C85C}"/>
+              </a:ext>
+            </a:extLst>
+          </p:cNvPr>
+          <p:cNvSpPr>
+            <a:spLocks noGrp="1"/>
+          </p:cNvSpPr>
+          <p:nvPr>
+            <p:ph type="title"/>
+          </p:nvPr>
+        </p:nvSpPr>
+        <p:spPr>
+          <a:xfrm>
+            <a:off x="457200" y="685801"/>
+            <a:ext cx="13716000" cy="1143000"/>
+          </a:xfrm>
+        </p:spPr>
+        <p:txBody>
+          <a:bodyPr anchor="t">
+            <a:normAutofit/>
+          </a:bodyPr>
+          <a:lstStyle/>
+          <a:p>
+            <a:r>
+              <a:rPr lang="en-US" b="1"/>
+              <a:t>Hybrid PQC Migration &amp; Cryptographic Agility</a:t>
+            </a:r>
+            <a:endParaRPr lang="en-EG" b="1"/>
+          </a:p>
+        </p:txBody>
+      </p:sp>
+      <p:sp>
+        <p:nvSpPr>
+          <p:cNvPr id="3" name="Content Placeholder 2">
+            <a:extLst>
+              <a:ext uri="{FF2B5EF4-FFF2-40B4-BE49-F238E27FC236}">
+                <a16:creationId xmlns:a16="http://schemas.microsoft.com/office/drawing/2014/main" id="{55E2FC09-2BE9-0909-9752-B543E6630139}"/>
+              </a:ext>
+            </a:extLst>
+          </p:cNvPr>
+          <p:cNvSpPr>
+            <a:spLocks noGrp="1"/>
+          </p:cNvSpPr>
+          <p:nvPr>
+            <p:ph idx="4294967295"/>
+          </p:nvPr>
+        </p:nvSpPr>
+        <p:spPr>
+          <a:xfrm>
+            <a:off x="457200" y="1600200"/>
+            <a:ext cx="6583680" cy="5715001"/>
+          </a:xfrm>
+        </p:spPr>
+        <p:txBody>
+          <a:bodyPr anchor="t">
+            <a:normAutofit/>
+          </a:bodyPr>
+          <a:lstStyle/>
+          <a:p>
+            <a:pPr algn="just">
+              <a:lnSpc>
+                <a:spcPct val="95000"/>
+              </a:lnSpc>
+            </a:pPr>
+            <a:r>
+              <a:rPr lang="en-US" sz="1800" b="1" dirty="0"/>
+              <a:t>Cryptographic Agility</a:t>
+            </a:r>
+            <a:r>
+              <a:rPr lang="en-US" sz="1600" b="1" dirty="0"/>
+              <a:t>:</a:t>
+            </a:r>
+            <a:r>
+              <a:rPr lang="en-US" sz="1600" dirty="0"/>
+              <a:t> The ability to swiftly change cryptographic algorithms in applications and infrastructure as threats evolve or new standards emerge. This ensures future-proofing against "Harvest Now, Decrypt Later" (HNDL) attacks.</a:t>
+            </a:r>
+          </a:p>
+          <a:p>
+            <a:pPr algn="just">
+              <a:lnSpc>
+                <a:spcPct val="95000"/>
+              </a:lnSpc>
+            </a:pPr>
+            <a:r>
+              <a:rPr lang="en-US" sz="1800" b="1" dirty="0"/>
+              <a:t>Hybrid Migration</a:t>
+            </a:r>
+            <a:r>
+              <a:rPr lang="en-US" sz="1600" b="1" dirty="0"/>
+              <a:t>:</a:t>
+            </a:r>
+            <a:r>
+              <a:rPr lang="en-US" sz="1600" dirty="0"/>
+              <a:t> An intermediate step combining a classical algorithm (like RSA or ECC) with a post-quantum algorithm (like ML-KEM). This provides redundancy; if one algorithm is compromised, the other maintains security.</a:t>
+            </a:r>
+          </a:p>
+          <a:p>
+            <a:pPr algn="just">
+              <a:lnSpc>
+                <a:spcPct val="95000"/>
+              </a:lnSpc>
+            </a:pPr>
+            <a:br>
+              <a:rPr lang="en-US" sz="1600" dirty="0"/>
+            </a:br>
+            <a:endParaRPr lang="en-US" sz="1600" dirty="0"/>
+          </a:p>
+          <a:p>
+            <a:pPr algn="just">
+              <a:lnSpc>
+                <a:spcPct val="95000"/>
+              </a:lnSpc>
+            </a:pPr>
+            <a:r>
+              <a:rPr lang="en-US" sz="1800" b="1" dirty="0"/>
+              <a:t>Architectural Patterns for Migration</a:t>
+            </a:r>
+          </a:p>
+          <a:p>
+            <a:pPr marL="285750" indent="-285750" algn="just">
+              <a:lnSpc>
+                <a:spcPct val="95000"/>
+              </a:lnSpc>
+              <a:buFont typeface="Arial" panose="020B0604020202020204" pitchFamily="34" charset="0"/>
+              <a:buChar char="•"/>
+            </a:pPr>
+            <a:r>
+              <a:rPr lang="en-US" sz="1600" b="1" dirty="0"/>
+              <a:t>Proxy Pattern:</a:t>
+            </a:r>
+            <a:r>
+              <a:rPr lang="en-US" sz="1600" dirty="0"/>
+              <a:t> Overlaying an agile security layer on existing components to future-proof legacy systems without requiring a full hardware overhaul.</a:t>
+            </a:r>
+          </a:p>
+          <a:p>
+            <a:pPr marL="285750" indent="-285750" algn="just">
+              <a:lnSpc>
+                <a:spcPct val="95000"/>
+              </a:lnSpc>
+              <a:buFont typeface="Arial" panose="020B0604020202020204" pitchFamily="34" charset="0"/>
+              <a:buChar char="•"/>
+            </a:pPr>
+            <a:r>
+              <a:rPr lang="en-US" sz="1600" b="1" dirty="0"/>
+              <a:t>Upgrade Pattern:</a:t>
+            </a:r>
+            <a:r>
+              <a:rPr lang="en-US" sz="1600" dirty="0"/>
+              <a:t> Replacing components with versions that natively support NIST-standardized PQC algorithms like </a:t>
+            </a:r>
+            <a:r>
+              <a:rPr lang="en-US" sz="1600" b="1" dirty="0"/>
+              <a:t>ML-KEM (FIPS 203)</a:t>
+            </a:r>
+            <a:r>
+              <a:rPr lang="en-US" sz="1600" dirty="0"/>
+              <a:t> and </a:t>
+            </a:r>
+            <a:r>
+              <a:rPr lang="en-US" sz="1600" b="1" dirty="0"/>
+              <a:t>ML-DSA (FIPS 204)</a:t>
+            </a:r>
+            <a:r>
+              <a:rPr lang="en-US" sz="1600" dirty="0"/>
+              <a:t>.</a:t>
+            </a:r>
+          </a:p>
+          <a:p>
+            <a:pPr marL="285750" indent="-285750" algn="just">
+              <a:lnSpc>
+                <a:spcPct val="95000"/>
+              </a:lnSpc>
+              <a:buFont typeface="Arial" panose="020B0604020202020204" pitchFamily="34" charset="0"/>
+              <a:buChar char="•"/>
+            </a:pPr>
+            <a:r>
+              <a:rPr lang="en-US" sz="1600" b="1" dirty="0"/>
+              <a:t>QKD Pattern:</a:t>
+            </a:r>
+            <a:r>
+              <a:rPr lang="en-US" sz="1600" dirty="0"/>
+              <a:t> Utilizing Quantum Key Distribution for short-distance key exchanges that do not rely on mathematical algorithms.</a:t>
+            </a:r>
+          </a:p>
+          <a:p>
+            <a:pPr marL="514350" indent="-514350" algn="just">
+              <a:lnSpc>
+                <a:spcPct val="95000"/>
+              </a:lnSpc>
+              <a:buFont typeface="+mj-lt"/>
+              <a:buAutoNum type="arabicPeriod"/>
+            </a:pPr>
+            <a:endParaRPr lang="en-EG" sz="1600" dirty="0"/>
+          </a:p>
+        </p:txBody>
+      </p:sp>
+      <p:pic>
+        <p:nvPicPr>
+          <p:cNvPr id="5" name="Picture 4" descr="A diagram of a cloud computing network&#10;&#10;AI-generated content may be incorrect.">
+            <a:extLst>
+              <a:ext uri="{FF2B5EF4-FFF2-40B4-BE49-F238E27FC236}">
+                <a16:creationId xmlns:a16="http://schemas.microsoft.com/office/drawing/2014/main" id="{545A6B68-038A-486C-0921-DEC23046CC48}"/>
+              </a:ext>
+            </a:extLst>
+          </p:cNvPr>
+          <p:cNvPicPr>
+            <a:picLocks noChangeAspect="1"/>
+          </p:cNvPicPr>
+          <p:nvPr/>
+        </p:nvPicPr>
+        <p:blipFill>
+          <a:blip r:embed="rId2"/>
+          <a:stretch>
+            <a:fillRect/>
+          </a:stretch>
+        </p:blipFill>
+        <p:spPr>
+          <a:xfrm>
+            <a:off x="7315200" y="1905000"/>
+            <a:ext cx="6705600" cy="5029200"/>
+          </a:xfrm>
+          <a:prstGeom prst="rect">
+            <a:avLst/>
+          </a:prstGeom>
+          <a:noFill/>
+          <a:ln>
+            <a:solidFill>
+              <a:schemeClr val="accent1"/>
+            </a:solidFill>
+          </a:ln>
+        </p:spPr>
+      </p:pic>
+    </p:spTree>
+    <p:extLst>
+      <p:ext uri="{BB962C8B-B14F-4D97-AF65-F5344CB8AC3E}">
+        <p14:creationId xmlns:p14="http://schemas.microsoft.com/office/powerpoint/2010/main" val="2103599715"/>
+      </p:ext>
+    </p:extLst>
+  </p:cSld>
+  <p:clrMapOvr>
+    <a:masterClrMapping/>
+  </p:clrMapOvr>
+</p:sld>
+</file>
+
+<file path=ppt/slides/slide15.xml><?xml version="1.0" encoding="utf-8"?>
+<p:sld xmlns:a="http://schemas.openxmlformats.org/drawingml/2006/main" xmlns:r="http://schemas.openxmlformats.org/officeDocument/2006/relationships" xmlns:p="http://schemas.openxmlformats.org/presentationml/2006/main">
+  <p:cSld>
+    <p:spTree>
+      <p:nvGrpSpPr>
+        <p:cNvPr id="1" name="">
+          <a:extLst>
+            <a:ext uri="{FF2B5EF4-FFF2-40B4-BE49-F238E27FC236}">
               <a16:creationId xmlns:a16="http://schemas.microsoft.com/office/drawing/2014/main" id="{92F11DFC-A26C-4EE5-D34D-FE4B3A3A0CFD}"/>
             </a:ext>
           </a:extLst>
@@ -5871,7 +6146,7 @@
 </p:sld>
 </file>
 
-<file path=ppt/slides/slide15.xml><?xml version="1.0" encoding="utf-8"?>
+<file path=ppt/slides/slide16.xml><?xml version="1.0" encoding="utf-8"?>
 <p:sld xmlns:a="http://schemas.openxmlformats.org/drawingml/2006/main" xmlns:r="http://schemas.openxmlformats.org/officeDocument/2006/relationships" xmlns:p="http://schemas.openxmlformats.org/presentationml/2006/main">
   <p:cSld>
     <p:spTree>
@@ -12082,98 +12357,6 @@
                 <a:srgbClr val="051243"/>
               </a:solidFill>
               <a:latin typeface="Arial"/>
-            </a:endParaRPr>
-          </a:p>
-        </p:txBody>
-      </p:sp>
-      <p:sp>
-        <p:nvSpPr>
-          <p:cNvPr id="2" name="TextBox 1">
-            <a:extLst>
-              <a:ext uri="{FF2B5EF4-FFF2-40B4-BE49-F238E27FC236}">
-                <a16:creationId xmlns:a16="http://schemas.microsoft.com/office/drawing/2014/main" id="{39ACDFF2-6ED1-7EA0-9AEB-9B117657456B}"/>
-              </a:ext>
-            </a:extLst>
-          </p:cNvPr>
-          <p:cNvSpPr txBox="1"/>
-          <p:nvPr/>
-        </p:nvSpPr>
-        <p:spPr>
-          <a:xfrm>
-            <a:off x="1752600" y="7730053"/>
-            <a:ext cx="7315200" cy="338554"/>
-          </a:xfrm>
-          <a:prstGeom prst="rect">
-            <a:avLst/>
-          </a:prstGeom>
-          <a:noFill/>
-        </p:spPr>
-        <p:txBody>
-          <a:bodyPr wrap="square">
-            <a:spAutoFit/>
-          </a:bodyPr>
-          <a:lstStyle/>
-          <a:p>
-            <a:r>
-              <a:rPr lang="en-US" sz="1600" i="1" u="sng" dirty="0">
-                <a:solidFill>
-                  <a:schemeClr val="bg1"/>
-                </a:solidFill>
-              </a:rPr>
-              <a:t>https://</a:t>
-            </a:r>
-            <a:r>
-              <a:rPr lang="en-US" sz="1600" i="1" u="sng" dirty="0" err="1">
-                <a:solidFill>
-                  <a:schemeClr val="bg1"/>
-                </a:solidFill>
-              </a:rPr>
-              <a:t>solutions.fixed.global</a:t>
-            </a:r>
-            <a:r>
-              <a:rPr lang="en-US" sz="1600" i="1" u="sng" dirty="0">
-                <a:solidFill>
-                  <a:schemeClr val="bg1"/>
-                </a:solidFill>
-              </a:rPr>
-              <a:t>/</a:t>
-            </a:r>
-            <a:r>
-              <a:rPr lang="en-US" sz="1600" i="1" u="sng" dirty="0" err="1">
-                <a:solidFill>
-                  <a:schemeClr val="bg1"/>
-                </a:solidFill>
-              </a:rPr>
-              <a:t>en</a:t>
-            </a:r>
-            <a:r>
-              <a:rPr lang="en-US" sz="1600" i="1" u="sng" dirty="0">
-                <a:solidFill>
-                  <a:schemeClr val="bg1"/>
-                </a:solidFill>
-              </a:rPr>
-              <a:t>/</a:t>
-            </a:r>
-            <a:r>
-              <a:rPr lang="en-US" sz="1600" i="1" u="sng" dirty="0" err="1">
-                <a:solidFill>
-                  <a:schemeClr val="bg1"/>
-                </a:solidFill>
-              </a:rPr>
-              <a:t>oursolutions</a:t>
-            </a:r>
-            <a:r>
-              <a:rPr lang="en-US" sz="1600" i="1" u="sng" dirty="0">
-                <a:solidFill>
-                  <a:schemeClr val="bg1"/>
-                </a:solidFill>
-              </a:rPr>
-              <a:t>/cybersecurity</a:t>
-            </a:r>
-            <a:endParaRPr lang="en-EG" sz="1600" i="1" u="sng" dirty="0">
-              <a:solidFill>
-                <a:schemeClr val="bg1"/>
-              </a:solidFill>
             </a:endParaRPr>
           </a:p>
         </p:txBody>

</xml_diff>